<commit_message>
Finished Slides. Andres Poster added
</commit_message>
<xml_diff>
--- a/Presentation Slides/Final Presentation Slides.pptx
+++ b/Presentation Slides/Final Presentation Slides.pptx
@@ -5,26 +5,31 @@
     <p:sldMasterId id="2147483914" r:id="rId1"/>
   </p:sldMasterIdLst>
   <p:notesMasterIdLst>
-    <p:notesMasterId r:id="rId16"/>
+    <p:notesMasterId r:id="rId21"/>
   </p:notesMasterIdLst>
   <p:handoutMasterIdLst>
-    <p:handoutMasterId r:id="rId17"/>
+    <p:handoutMasterId r:id="rId22"/>
   </p:handoutMasterIdLst>
   <p:sldIdLst>
     <p:sldId id="256" r:id="rId2"/>
     <p:sldId id="343" r:id="rId3"/>
     <p:sldId id="344" r:id="rId4"/>
     <p:sldId id="345" r:id="rId5"/>
-    <p:sldId id="346" r:id="rId6"/>
-    <p:sldId id="347" r:id="rId7"/>
-    <p:sldId id="349" r:id="rId8"/>
-    <p:sldId id="350" r:id="rId9"/>
-    <p:sldId id="351" r:id="rId10"/>
-    <p:sldId id="352" r:id="rId11"/>
-    <p:sldId id="348" r:id="rId12"/>
-    <p:sldId id="353" r:id="rId13"/>
-    <p:sldId id="354" r:id="rId14"/>
-    <p:sldId id="355" r:id="rId15"/>
+    <p:sldId id="356" r:id="rId6"/>
+    <p:sldId id="357" r:id="rId7"/>
+    <p:sldId id="358" r:id="rId8"/>
+    <p:sldId id="359" r:id="rId9"/>
+    <p:sldId id="360" r:id="rId10"/>
+    <p:sldId id="361" r:id="rId11"/>
+    <p:sldId id="362" r:id="rId12"/>
+    <p:sldId id="346" r:id="rId13"/>
+    <p:sldId id="347" r:id="rId14"/>
+    <p:sldId id="349" r:id="rId15"/>
+    <p:sldId id="350" r:id="rId16"/>
+    <p:sldId id="352" r:id="rId17"/>
+    <p:sldId id="354" r:id="rId18"/>
+    <p:sldId id="363" r:id="rId19"/>
+    <p:sldId id="355" r:id="rId20"/>
   </p:sldIdLst>
   <p:sldSz cx="9144000" cy="6858000" type="screen4x3"/>
   <p:notesSz cx="6858000" cy="9144000"/>
@@ -286,7 +291,7 @@
               <a:pPr>
                 <a:defRPr/>
               </a:pPr>
-              <a:t>11/29/17</a:t>
+              <a:t>12/15/17</a:t>
             </a:fld>
             <a:endParaRPr lang="en-US"/>
           </a:p>
@@ -491,7 +496,7 @@
               <a:pPr>
                 <a:defRPr/>
               </a:pPr>
-              <a:t>11/29/17</a:t>
+              <a:t>12/15/17</a:t>
             </a:fld>
             <a:endParaRPr lang="en-US"/>
           </a:p>
@@ -963,25 +968,19 @@
           <a:p>
             <a:r>
               <a:rPr lang="en-US" dirty="0" smtClean="0"/>
-              <a:t>6. Detailed design:</a:t>
-            </a:r>
-          </a:p>
-          <a:p>
-            <a:r>
-              <a:rPr lang="en-US" dirty="0" smtClean="0"/>
-              <a:t>6.1. Minimal class diagram. Identify the design patterns used (one or more slides).</a:t>
-            </a:r>
-          </a:p>
-          <a:p>
-            <a:r>
-              <a:rPr lang="en-US" dirty="0" smtClean="0"/>
-              <a:t>6.2. State machine for the main control object or the most important object of the implemented uses cases (one or more slides).</a:t>
-            </a:r>
-          </a:p>
-          <a:p>
-            <a:r>
-              <a:rPr lang="en-US" dirty="0" smtClean="0"/>
-              <a:t>6.3. Main algorithm used related to an implemented use case described above (one or more slides).</a:t>
+              <a:t>7. Test Suites and Test Cases (one sunny day and one rainy day) for the use case represented in part (5) above (2 slides).</a:t>
+            </a:r>
+          </a:p>
+          <a:p>
+            <a:r>
+              <a:rPr lang="en-US" dirty="0" smtClean="0"/>
+              <a:t>7.1 One sunny day and one rainy day for the implemented use cases (one or more slides).</a:t>
+            </a:r>
+          </a:p>
+          <a:p>
+            <a:r>
+              <a:rPr lang="en-US" dirty="0" smtClean="0"/>
+              <a:t>7.2 Automated test scripts for the implemented use cases (one or more slides).</a:t>
             </a:r>
           </a:p>
           <a:p>
@@ -1007,7 +1006,7 @@
             <a:fld id="{A6446FAC-226B-4115-960C-7B2E97248D67}" type="slidenum">
               <a:rPr lang="en-US" altLang="en-US" smtClean="0"/>
               <a:pPr/>
-              <a:t>10</a:t>
+              <a:t>17</a:t>
             </a:fld>
             <a:endParaRPr lang="en-US" altLang="en-US"/>
           </a:p>
@@ -1016,7 +1015,7 @@
     </p:spTree>
     <p:extLst>
       <p:ext uri="{BB962C8B-B14F-4D97-AF65-F5344CB8AC3E}">
-        <p14:creationId xmlns:p14="http://schemas.microsoft.com/office/powerpoint/2010/main" val="458351287"/>
+        <p14:creationId xmlns:p14="http://schemas.microsoft.com/office/powerpoint/2010/main" val="345689425"/>
       </p:ext>
     </p:extLst>
   </p:cSld>
@@ -1072,29 +1071,20 @@
           <a:p>
             <a:r>
               <a:rPr lang="en-US" dirty="0" smtClean="0"/>
-              <a:t>6. Detailed design:</a:t>
-            </a:r>
-          </a:p>
-          <a:p>
-            <a:r>
-              <a:rPr lang="en-US" dirty="0" smtClean="0"/>
-              <a:t>6.1. Minimal class diagram. Identify the design patterns used (one or more slides).</a:t>
-            </a:r>
-          </a:p>
-          <a:p>
-            <a:r>
-              <a:rPr lang="en-US" dirty="0" smtClean="0"/>
-              <a:t>6.2. State machine for the main control object or the most important object of the implemented uses cases (one or more slides).</a:t>
-            </a:r>
-          </a:p>
-          <a:p>
-            <a:r>
-              <a:rPr lang="en-US" dirty="0" smtClean="0"/>
-              <a:t>6.3. Main algorithm used related to an implemented use case described above (one or more slides).</a:t>
-            </a:r>
-          </a:p>
-          <a:p>
-            <a:endParaRPr lang="en-US" dirty="0" smtClean="0"/>
+              <a:t>7. Test Suites and Test Cases (one sunny day and one rainy day) for the use case represented in part (5) above (2 slides).</a:t>
+            </a:r>
+          </a:p>
+          <a:p>
+            <a:r>
+              <a:rPr lang="en-US" dirty="0" smtClean="0"/>
+              <a:t>7.1 One sunny day and one rainy day for the implemented use cases (one or more slides).</a:t>
+            </a:r>
+          </a:p>
+          <a:p>
+            <a:r>
+              <a:rPr lang="en-US" dirty="0" smtClean="0"/>
+              <a:t>7.2 Automated test scripts for the implemented use cases (one or more slides).</a:t>
+            </a:r>
           </a:p>
           <a:p>
             <a:endParaRPr lang="en-US" dirty="0"/>
@@ -1119,7 +1109,7 @@
             <a:fld id="{A6446FAC-226B-4115-960C-7B2E97248D67}" type="slidenum">
               <a:rPr lang="en-US" altLang="en-US" smtClean="0"/>
               <a:pPr/>
-              <a:t>11</a:t>
+              <a:t>18</a:t>
             </a:fld>
             <a:endParaRPr lang="en-US" altLang="en-US"/>
           </a:p>
@@ -1128,7 +1118,7 @@
     </p:spTree>
     <p:extLst>
       <p:ext uri="{BB962C8B-B14F-4D97-AF65-F5344CB8AC3E}">
-        <p14:creationId xmlns:p14="http://schemas.microsoft.com/office/powerpoint/2010/main" val="2426442925"/>
+        <p14:creationId xmlns:p14="http://schemas.microsoft.com/office/powerpoint/2010/main" val="1998422302"/>
       </p:ext>
     </p:extLst>
   </p:cSld>
@@ -1184,32 +1174,29 @@
           <a:p>
             <a:r>
               <a:rPr lang="en-US" dirty="0" smtClean="0"/>
-              <a:t>6. Detailed design:</a:t>
-            </a:r>
-          </a:p>
-          <a:p>
-            <a:r>
-              <a:rPr lang="en-US" dirty="0" smtClean="0"/>
-              <a:t>6.1. Minimal class diagram. Identify the design patterns used (one or more slides).</a:t>
-            </a:r>
-          </a:p>
-          <a:p>
-            <a:r>
-              <a:rPr lang="en-US" dirty="0" smtClean="0"/>
-              <a:t>6.2. State machine for the main control object or the most important object of the implemented uses cases (one or more slides).</a:t>
-            </a:r>
-          </a:p>
-          <a:p>
-            <a:r>
-              <a:rPr lang="en-US" dirty="0" smtClean="0"/>
-              <a:t>6.3. Main algorithm used related to an implemented use case described above (one or more slides).</a:t>
-            </a:r>
-          </a:p>
-          <a:p>
-            <a:endParaRPr lang="en-US" dirty="0" smtClean="0"/>
-          </a:p>
-          <a:p>
-            <a:endParaRPr lang="en-US" dirty="0"/>
+              <a:t>Summarize your contribution</a:t>
+            </a:r>
+          </a:p>
+          <a:p>
+            <a:r>
+              <a:rPr lang="en-US" dirty="0" smtClean="0"/>
+              <a:t>Include your contact information</a:t>
+            </a:r>
+          </a:p>
+          <a:p>
+            <a:r>
+              <a:rPr lang="en-US" dirty="0" smtClean="0"/>
+              <a:t>Ask if anyone has any questions for you.</a:t>
+            </a:r>
+          </a:p>
+          <a:p>
+            <a:r>
+              <a:rPr lang="en-US" smtClean="0"/>
+              <a:t>Thank your audience</a:t>
+            </a:r>
+          </a:p>
+          <a:p>
+            <a:endParaRPr lang="en-US"/>
           </a:p>
         </p:txBody>
       </p:sp>
@@ -1231,219 +1218,7 @@
             <a:fld id="{A6446FAC-226B-4115-960C-7B2E97248D67}" type="slidenum">
               <a:rPr lang="en-US" altLang="en-US" smtClean="0"/>
               <a:pPr/>
-              <a:t>12</a:t>
-            </a:fld>
-            <a:endParaRPr lang="en-US" altLang="en-US"/>
-          </a:p>
-        </p:txBody>
-      </p:sp>
-    </p:spTree>
-    <p:extLst>
-      <p:ext uri="{BB962C8B-B14F-4D97-AF65-F5344CB8AC3E}">
-        <p14:creationId xmlns:p14="http://schemas.microsoft.com/office/powerpoint/2010/main" val="2426442925"/>
-      </p:ext>
-    </p:extLst>
-  </p:cSld>
-  <p:clrMapOvr>
-    <a:masterClrMapping/>
-  </p:clrMapOvr>
-</p:notes>
-</file>
-
-<file path=ppt/notesSlides/notesSlide13.xml><?xml version="1.0" encoding="utf-8"?>
-<p:notes xmlns:a="http://schemas.openxmlformats.org/drawingml/2006/main" xmlns:r="http://schemas.openxmlformats.org/officeDocument/2006/relationships" xmlns:p="http://schemas.openxmlformats.org/presentationml/2006/main">
-  <p:cSld>
-    <p:spTree>
-      <p:nvGrpSpPr>
-        <p:cNvPr id="1" name=""/>
-        <p:cNvGrpSpPr/>
-        <p:nvPr/>
-      </p:nvGrpSpPr>
-      <p:grpSpPr>
-        <a:xfrm>
-          <a:off x="0" y="0"/>
-          <a:ext cx="0" cy="0"/>
-          <a:chOff x="0" y="0"/>
-          <a:chExt cx="0" cy="0"/>
-        </a:xfrm>
-      </p:grpSpPr>
-      <p:sp>
-        <p:nvSpPr>
-          <p:cNvPr id="2" name="Slide Image Placeholder 1"/>
-          <p:cNvSpPr>
-            <a:spLocks noGrp="1" noRot="1" noChangeAspect="1"/>
-          </p:cNvSpPr>
-          <p:nvPr>
-            <p:ph type="sldImg"/>
-          </p:nvPr>
-        </p:nvSpPr>
-        <p:spPr/>
-      </p:sp>
-      <p:sp>
-        <p:nvSpPr>
-          <p:cNvPr id="3" name="Notes Placeholder 2"/>
-          <p:cNvSpPr>
-            <a:spLocks noGrp="1"/>
-          </p:cNvSpPr>
-          <p:nvPr>
-            <p:ph type="body" idx="1"/>
-          </p:nvPr>
-        </p:nvSpPr>
-        <p:spPr/>
-        <p:txBody>
-          <a:bodyPr/>
-          <a:lstStyle/>
-          <a:p>
-            <a:r>
-              <a:rPr lang="en-US" dirty="0" smtClean="0"/>
-              <a:t>7. Test Suites and Test Cases (one sunny day and one rainy day) for the use case represented in part (5) above (2 slides).</a:t>
-            </a:r>
-          </a:p>
-          <a:p>
-            <a:r>
-              <a:rPr lang="en-US" dirty="0" smtClean="0"/>
-              <a:t>7.1 One sunny day and one rainy day for the implemented use cases (one or more slides).</a:t>
-            </a:r>
-          </a:p>
-          <a:p>
-            <a:r>
-              <a:rPr lang="en-US" dirty="0" smtClean="0"/>
-              <a:t>7.2 Automated test scripts for the implemented use cases (one or more slides).</a:t>
-            </a:r>
-          </a:p>
-          <a:p>
-            <a:endParaRPr lang="en-US" dirty="0"/>
-          </a:p>
-        </p:txBody>
-      </p:sp>
-      <p:sp>
-        <p:nvSpPr>
-          <p:cNvPr id="4" name="Slide Number Placeholder 3"/>
-          <p:cNvSpPr>
-            <a:spLocks noGrp="1"/>
-          </p:cNvSpPr>
-          <p:nvPr>
-            <p:ph type="sldNum" sz="quarter" idx="10"/>
-          </p:nvPr>
-        </p:nvSpPr>
-        <p:spPr/>
-        <p:txBody>
-          <a:bodyPr/>
-          <a:lstStyle/>
-          <a:p>
-            <a:fld id="{A6446FAC-226B-4115-960C-7B2E97248D67}" type="slidenum">
-              <a:rPr lang="en-US" altLang="en-US" smtClean="0"/>
-              <a:pPr/>
-              <a:t>13</a:t>
-            </a:fld>
-            <a:endParaRPr lang="en-US" altLang="en-US"/>
-          </a:p>
-        </p:txBody>
-      </p:sp>
-    </p:spTree>
-    <p:extLst>
-      <p:ext uri="{BB962C8B-B14F-4D97-AF65-F5344CB8AC3E}">
-        <p14:creationId xmlns:p14="http://schemas.microsoft.com/office/powerpoint/2010/main" val="345689425"/>
-      </p:ext>
-    </p:extLst>
-  </p:cSld>
-  <p:clrMapOvr>
-    <a:masterClrMapping/>
-  </p:clrMapOvr>
-</p:notes>
-</file>
-
-<file path=ppt/notesSlides/notesSlide14.xml><?xml version="1.0" encoding="utf-8"?>
-<p:notes xmlns:a="http://schemas.openxmlformats.org/drawingml/2006/main" xmlns:r="http://schemas.openxmlformats.org/officeDocument/2006/relationships" xmlns:p="http://schemas.openxmlformats.org/presentationml/2006/main">
-  <p:cSld>
-    <p:spTree>
-      <p:nvGrpSpPr>
-        <p:cNvPr id="1" name=""/>
-        <p:cNvGrpSpPr/>
-        <p:nvPr/>
-      </p:nvGrpSpPr>
-      <p:grpSpPr>
-        <a:xfrm>
-          <a:off x="0" y="0"/>
-          <a:ext cx="0" cy="0"/>
-          <a:chOff x="0" y="0"/>
-          <a:chExt cx="0" cy="0"/>
-        </a:xfrm>
-      </p:grpSpPr>
-      <p:sp>
-        <p:nvSpPr>
-          <p:cNvPr id="2" name="Slide Image Placeholder 1"/>
-          <p:cNvSpPr>
-            <a:spLocks noGrp="1" noRot="1" noChangeAspect="1"/>
-          </p:cNvSpPr>
-          <p:nvPr>
-            <p:ph type="sldImg"/>
-          </p:nvPr>
-        </p:nvSpPr>
-        <p:spPr/>
-      </p:sp>
-      <p:sp>
-        <p:nvSpPr>
-          <p:cNvPr id="3" name="Notes Placeholder 2"/>
-          <p:cNvSpPr>
-            <a:spLocks noGrp="1"/>
-          </p:cNvSpPr>
-          <p:nvPr>
-            <p:ph type="body" idx="1"/>
-          </p:nvPr>
-        </p:nvSpPr>
-        <p:spPr/>
-        <p:txBody>
-          <a:bodyPr/>
-          <a:lstStyle/>
-          <a:p>
-            <a:r>
-              <a:rPr lang="en-US" dirty="0" smtClean="0"/>
-              <a:t>Summarize your contribution</a:t>
-            </a:r>
-          </a:p>
-          <a:p>
-            <a:r>
-              <a:rPr lang="en-US" dirty="0" smtClean="0"/>
-              <a:t>Include your contact information</a:t>
-            </a:r>
-          </a:p>
-          <a:p>
-            <a:r>
-              <a:rPr lang="en-US" dirty="0" smtClean="0"/>
-              <a:t>Ask if anyone has any questions for you.</a:t>
-            </a:r>
-          </a:p>
-          <a:p>
-            <a:r>
-              <a:rPr lang="en-US" smtClean="0"/>
-              <a:t>Thank your audience</a:t>
-            </a:r>
-          </a:p>
-          <a:p>
-            <a:endParaRPr lang="en-US"/>
-          </a:p>
-        </p:txBody>
-      </p:sp>
-      <p:sp>
-        <p:nvSpPr>
-          <p:cNvPr id="4" name="Slide Number Placeholder 3"/>
-          <p:cNvSpPr>
-            <a:spLocks noGrp="1"/>
-          </p:cNvSpPr>
-          <p:nvPr>
-            <p:ph type="sldNum" sz="quarter" idx="10"/>
-          </p:nvPr>
-        </p:nvSpPr>
-        <p:spPr/>
-        <p:txBody>
-          <a:bodyPr/>
-          <a:lstStyle/>
-          <a:p>
-            <a:fld id="{A6446FAC-226B-4115-960C-7B2E97248D67}" type="slidenum">
-              <a:rPr lang="en-US" altLang="en-US" smtClean="0"/>
-              <a:pPr/>
-              <a:t>14</a:t>
+              <a:t>19</a:t>
             </a:fld>
             <a:endParaRPr lang="en-US" altLang="en-US"/>
           </a:p>
@@ -1857,7 +1632,7 @@
             <a:fld id="{A6446FAC-226B-4115-960C-7B2E97248D67}" type="slidenum">
               <a:rPr lang="en-US" altLang="en-US" smtClean="0"/>
               <a:pPr/>
-              <a:t>5</a:t>
+              <a:t>12</a:t>
             </a:fld>
             <a:endParaRPr lang="en-US" altLang="en-US"/>
           </a:p>
@@ -1966,7 +1741,7 @@
             <a:fld id="{A6446FAC-226B-4115-960C-7B2E97248D67}" type="slidenum">
               <a:rPr lang="en-US" altLang="en-US" smtClean="0"/>
               <a:pPr/>
-              <a:t>6</a:t>
+              <a:t>13</a:t>
             </a:fld>
             <a:endParaRPr lang="en-US" altLang="en-US"/>
           </a:p>
@@ -2081,7 +1856,7 @@
             <a:fld id="{A6446FAC-226B-4115-960C-7B2E97248D67}" type="slidenum">
               <a:rPr lang="en-US" altLang="en-US" smtClean="0"/>
               <a:pPr/>
-              <a:t>7</a:t>
+              <a:t>14</a:t>
             </a:fld>
             <a:endParaRPr lang="en-US" altLang="en-US"/>
           </a:p>
@@ -2196,7 +1971,7 @@
             <a:fld id="{A6446FAC-226B-4115-960C-7B2E97248D67}" type="slidenum">
               <a:rPr lang="en-US" altLang="en-US" smtClean="0"/>
               <a:pPr/>
-              <a:t>8</a:t>
+              <a:t>15</a:t>
             </a:fld>
             <a:endParaRPr lang="en-US" altLang="en-US"/>
           </a:p>
@@ -2261,31 +2036,25 @@
           <a:p>
             <a:r>
               <a:rPr lang="en-US" dirty="0" smtClean="0"/>
-              <a:t>5. System design:</a:t>
-            </a:r>
-          </a:p>
-          <a:p>
-            <a:r>
-              <a:rPr lang="en-US" dirty="0" smtClean="0"/>
-              <a:t>5.1. System decomposition; identify the architecture patterns used (one slide).</a:t>
-            </a:r>
-          </a:p>
-          <a:p>
-            <a:r>
-              <a:rPr lang="en-US" dirty="0" smtClean="0"/>
-              <a:t>5.2. System deployment – h/w and s/w requirements (one slide).</a:t>
-            </a:r>
-          </a:p>
-          <a:p>
-            <a:r>
-              <a:rPr lang="en-US" dirty="0" smtClean="0"/>
-              <a:t>5.3. Persistent data design (one slide).</a:t>
-            </a:r>
-          </a:p>
-          <a:p>
-            <a:r>
-              <a:rPr lang="en-US" dirty="0" smtClean="0"/>
-              <a:t>5.4. Security/Privacy (one slide).</a:t>
+              <a:t>6. Detailed design:</a:t>
+            </a:r>
+          </a:p>
+          <a:p>
+            <a:r>
+              <a:rPr lang="en-US" dirty="0" smtClean="0"/>
+              <a:t>6.1. Minimal class diagram. Identify the design patterns used (one or more slides).</a:t>
+            </a:r>
+          </a:p>
+          <a:p>
+            <a:r>
+              <a:rPr lang="en-US" dirty="0" smtClean="0"/>
+              <a:t>6.2. State machine for the main control object or the most important object of the implemented uses cases (one or more slides).</a:t>
+            </a:r>
+          </a:p>
+          <a:p>
+            <a:r>
+              <a:rPr lang="en-US" dirty="0" smtClean="0"/>
+              <a:t>6.3. Main algorithm used related to an implemented use case described above (one or more slides).</a:t>
             </a:r>
           </a:p>
           <a:p>
@@ -2311,7 +2080,7 @@
             <a:fld id="{A6446FAC-226B-4115-960C-7B2E97248D67}" type="slidenum">
               <a:rPr lang="en-US" altLang="en-US" smtClean="0"/>
               <a:pPr/>
-              <a:t>9</a:t>
+              <a:t>16</a:t>
             </a:fld>
             <a:endParaRPr lang="en-US" altLang="en-US"/>
           </a:p>
@@ -2320,7 +2089,7 @@
     </p:spTree>
     <p:extLst>
       <p:ext uri="{BB962C8B-B14F-4D97-AF65-F5344CB8AC3E}">
-        <p14:creationId xmlns:p14="http://schemas.microsoft.com/office/powerpoint/2010/main" val="2880857459"/>
+        <p14:creationId xmlns:p14="http://schemas.microsoft.com/office/powerpoint/2010/main" val="458351287"/>
       </p:ext>
     </p:extLst>
   </p:cSld>
@@ -2610,7 +2379,7 @@
               <a:pPr>
                 <a:defRPr/>
               </a:pPr>
-              <a:t>11/29/17</a:t>
+              <a:t>12/15/17</a:t>
             </a:fld>
             <a:endParaRPr lang="en-US"/>
           </a:p>
@@ -2753,7 +2522,7 @@
               <a:pPr>
                 <a:defRPr/>
               </a:pPr>
-              <a:t>11/29/17</a:t>
+              <a:t>12/15/17</a:t>
             </a:fld>
             <a:endParaRPr lang="en-US"/>
           </a:p>
@@ -3110,7 +2879,7 @@
               <a:pPr>
                 <a:defRPr/>
               </a:pPr>
-              <a:t>11/29/17</a:t>
+              <a:t>12/15/17</a:t>
             </a:fld>
             <a:endParaRPr lang="en-US"/>
           </a:p>
@@ -3470,7 +3239,7 @@
               <a:pPr>
                 <a:defRPr/>
               </a:pPr>
-              <a:t>11/29/17</a:t>
+              <a:t>12/15/17</a:t>
             </a:fld>
             <a:endParaRPr lang="en-US"/>
           </a:p>
@@ -3833,7 +3602,7 @@
               <a:pPr>
                 <a:defRPr/>
               </a:pPr>
-              <a:t>11/29/17</a:t>
+              <a:t>12/15/17</a:t>
             </a:fld>
             <a:endParaRPr lang="en-US"/>
           </a:p>
@@ -4201,7 +3970,7 @@
               <a:pPr>
                 <a:defRPr/>
               </a:pPr>
-              <a:t>11/29/17</a:t>
+              <a:t>12/15/17</a:t>
             </a:fld>
             <a:endParaRPr lang="en-US"/>
           </a:p>
@@ -4452,7 +4221,7 @@
               <a:pPr>
                 <a:defRPr/>
               </a:pPr>
-              <a:t>11/29/17</a:t>
+              <a:t>12/15/17</a:t>
             </a:fld>
             <a:endParaRPr lang="en-US"/>
           </a:p>
@@ -4708,7 +4477,7 @@
               <a:pPr>
                 <a:defRPr/>
               </a:pPr>
-              <a:t>11/29/17</a:t>
+              <a:t>12/15/17</a:t>
             </a:fld>
             <a:endParaRPr lang="en-US"/>
           </a:p>
@@ -4954,7 +4723,7 @@
               <a:pPr>
                 <a:defRPr/>
               </a:pPr>
-              <a:t>11/29/17</a:t>
+              <a:t>12/15/17</a:t>
             </a:fld>
             <a:endParaRPr lang="en-US"/>
           </a:p>
@@ -5283,7 +5052,7 @@
               <a:pPr>
                 <a:defRPr/>
               </a:pPr>
-              <a:t>11/29/17</a:t>
+              <a:t>12/15/17</a:t>
             </a:fld>
             <a:endParaRPr lang="en-US"/>
           </a:p>
@@ -5651,7 +5420,7 @@
               <a:pPr>
                 <a:defRPr/>
               </a:pPr>
-              <a:t>11/29/17</a:t>
+              <a:t>12/15/17</a:t>
             </a:fld>
             <a:endParaRPr lang="en-US"/>
           </a:p>
@@ -6314,7 +6083,7 @@
               <a:pPr>
                 <a:defRPr/>
               </a:pPr>
-              <a:t>11/29/17</a:t>
+              <a:t>12/15/17</a:t>
             </a:fld>
             <a:endParaRPr lang="en-US"/>
           </a:p>
@@ -6682,7 +6451,7 @@
               <a:pPr>
                 <a:defRPr/>
               </a:pPr>
-              <a:t>11/29/17</a:t>
+              <a:t>12/15/17</a:t>
             </a:fld>
             <a:endParaRPr lang="en-US"/>
           </a:p>
@@ -7137,7 +6906,7 @@
               <a:pPr>
                 <a:defRPr/>
               </a:pPr>
-              <a:t>11/29/17</a:t>
+              <a:t>12/15/17</a:t>
             </a:fld>
             <a:endParaRPr lang="en-US"/>
           </a:p>
@@ -7679,7 +7448,7 @@
               <a:pPr>
                 <a:defRPr/>
               </a:pPr>
-              <a:t>11/29/17</a:t>
+              <a:t>12/15/17</a:t>
             </a:fld>
             <a:endParaRPr lang="en-US"/>
           </a:p>
@@ -7873,7 +7642,7 @@
               <a:pPr>
                 <a:defRPr/>
               </a:pPr>
-              <a:t>11/29/17</a:t>
+              <a:t>12/15/17</a:t>
             </a:fld>
             <a:endParaRPr lang="en-US"/>
           </a:p>
@@ -8228,7 +7997,7 @@
               <a:pPr>
                 <a:defRPr/>
               </a:pPr>
-              <a:t>11/29/17</a:t>
+              <a:t>12/15/17</a:t>
             </a:fld>
             <a:endParaRPr lang="en-US"/>
           </a:p>
@@ -8843,12 +8612,6 @@
               </a:rPr>
               <a:t>VIP Website 7.0</a:t>
             </a:r>
-            <a:r>
-              <a:rPr lang="en-US" altLang="en-US" dirty="0" smtClean="0">
-                <a:ea typeface="ＭＳ Ｐゴシック" pitchFamily="34" charset="-128"/>
-              </a:rPr>
-              <a:t/>
-            </a:r>
             <a:br>
               <a:rPr lang="en-US" altLang="en-US" dirty="0" smtClean="0">
                 <a:ea typeface="ＭＳ Ｐゴシック" pitchFamily="34" charset="-128"/>
@@ -8858,13 +8621,7 @@
               <a:rPr lang="en-US" altLang="en-US" sz="2800" dirty="0" smtClean="0">
                 <a:ea typeface="ＭＳ Ｐゴシック" pitchFamily="34" charset="-128"/>
               </a:rPr>
-              <a:t>Team Member(s): </a:t>
-            </a:r>
-            <a:r>
-              <a:rPr lang="en-US" altLang="en-US" sz="2800" dirty="0" smtClean="0">
-                <a:ea typeface="ＭＳ Ｐゴシック" pitchFamily="34" charset="-128"/>
-              </a:rPr>
-              <a:t>Steve </a:t>
+              <a:t>Team Member(s): Steve </a:t>
             </a:r>
             <a:r>
               <a:rPr lang="en-US" altLang="en-US" sz="2800" dirty="0" err="1" smtClean="0">
@@ -8877,12 +8634,6 @@
                 <a:ea typeface="ＭＳ Ｐゴシック" pitchFamily="34" charset="-128"/>
               </a:rPr>
               <a:t>, Andres Moser, Leon Liang, Adam Levy, and Dale Keith</a:t>
-            </a:r>
-            <a:r>
-              <a:rPr lang="en-US" altLang="en-US" sz="2800" dirty="0" smtClean="0">
-                <a:ea typeface="ＭＳ Ｐゴシック" pitchFamily="34" charset="-128"/>
-              </a:rPr>
-              <a:t/>
             </a:r>
             <a:br>
               <a:rPr lang="en-US" altLang="en-US" sz="2800" dirty="0" smtClean="0">
@@ -8893,13 +8644,7 @@
               <a:rPr lang="en-US" altLang="en-US" sz="2800" dirty="0" smtClean="0">
                 <a:ea typeface="ＭＳ Ｐゴシック" pitchFamily="34" charset="-128"/>
               </a:rPr>
-              <a:t>Product Owner(s): </a:t>
-            </a:r>
-            <a:r>
-              <a:rPr lang="en-US" altLang="en-US" sz="2800" dirty="0" smtClean="0">
-                <a:ea typeface="ＭＳ Ｐゴシック" pitchFamily="34" charset="-128"/>
-              </a:rPr>
-              <a:t>Francisco Ortega, </a:t>
+              <a:t>Product Owner(s): Francisco Ortega, </a:t>
             </a:r>
             <a:r>
               <a:rPr lang="en-US" altLang="en-US" sz="2800" dirty="0" err="1" smtClean="0">
@@ -8934,13 +8679,7 @@
               <a:rPr lang="en-US" altLang="en-US" sz="2800" dirty="0" smtClean="0">
                 <a:ea typeface="ＭＳ Ｐゴシック" pitchFamily="34" charset="-128"/>
               </a:rPr>
-              <a:t>Professor</a:t>
-            </a:r>
-            <a:r>
-              <a:rPr lang="en-US" altLang="en-US" sz="2800" dirty="0" smtClean="0">
-                <a:ea typeface="ＭＳ Ｐゴシック" pitchFamily="34" charset="-128"/>
-              </a:rPr>
-              <a:t>: Masoud Sadjadi</a:t>
+              <a:t>Professor: Masoud Sadjadi</a:t>
             </a:r>
             <a:br>
               <a:rPr lang="en-US" altLang="en-US" sz="2800" dirty="0" smtClean="0">
@@ -9008,9 +8747,6 @@
               </a:rPr>
               <a:t>December 1, 2017</a:t>
             </a:r>
-            <a:endParaRPr lang="en-US" altLang="en-US" dirty="0" smtClean="0">
-              <a:ea typeface="ＭＳ Ｐゴシック" pitchFamily="34" charset="-128"/>
-            </a:endParaRPr>
           </a:p>
         </p:txBody>
       </p:sp>
@@ -9286,7 +9022,15 @@
           <a:p>
             <a:r>
               <a:rPr lang="en-US" dirty="0" smtClean="0"/>
-              <a:t>Minimal Class Diagram</a:t>
+              <a:t>C</a:t>
+            </a:r>
+            <a:r>
+              <a:rPr lang="en-US" dirty="0"/>
+              <a:t>reate Admin Panel </a:t>
+            </a:r>
+            <a:r>
+              <a:rPr lang="en-US" dirty="0" smtClean="0"/>
+              <a:t>Tabs</a:t>
             </a:r>
             <a:endParaRPr lang="en-US" dirty="0"/>
           </a:p>
@@ -9304,34 +9048,102 @@
         </p:nvSpPr>
         <p:spPr/>
         <p:txBody>
-          <a:bodyPr/>
+          <a:bodyPr>
+            <a:normAutofit/>
+          </a:bodyPr>
           <a:lstStyle/>
           <a:p>
             <a:r>
+              <a:rPr lang="en-US" dirty="0" smtClean="0"/>
+              <a:t>Description</a:t>
+            </a:r>
+          </a:p>
+          <a:p>
+            <a:pPr lvl="1"/>
+            <a:r>
+              <a:rPr lang="en-US" dirty="0" smtClean="0"/>
+              <a:t>A</a:t>
+            </a:r>
+            <a:r>
               <a:rPr lang="en-US" dirty="0"/>
-              <a:t>Identify the design patterns used </a:t>
+              <a:t>s a PI/Co-PI, I want to be able to navigate to different admin functionality through tabs so that I would not have to manually scroll down to the bottom in order to access functionality.</a:t>
             </a:r>
             <a:endParaRPr lang="en-US" dirty="0" smtClean="0"/>
           </a:p>
           <a:p>
             <a:r>
               <a:rPr lang="en-US" dirty="0" smtClean="0"/>
-              <a:t>Highlight the classes that you created/modified</a:t>
-            </a:r>
+              <a:t>Acceptance Criteria</a:t>
+            </a:r>
+          </a:p>
+          <a:p>
+            <a:pPr lvl="1"/>
+            <a:r>
+              <a:rPr lang="en-US" dirty="0" smtClean="0"/>
+              <a:t>T</a:t>
+            </a:r>
+            <a:r>
+              <a:rPr lang="en-US" dirty="0"/>
+              <a:t>he tabs should directly take user to functionality corresponding to the tab in one </a:t>
+            </a:r>
+            <a:r>
+              <a:rPr lang="en-US" dirty="0" smtClean="0"/>
+              <a:t>click</a:t>
+            </a:r>
+          </a:p>
+          <a:p>
+            <a:pPr lvl="1"/>
+            <a:r>
+              <a:rPr lang="en-US" dirty="0" smtClean="0"/>
+              <a:t>Tabs </a:t>
+            </a:r>
+            <a:r>
+              <a:rPr lang="en-US" dirty="0"/>
+              <a:t>should contain all functionality from </a:t>
+            </a:r>
+            <a:r>
+              <a:rPr lang="en-US" dirty="0" smtClean="0"/>
+              <a:t>before</a:t>
+            </a:r>
+          </a:p>
+          <a:p>
+            <a:pPr lvl="1"/>
+            <a:r>
+              <a:rPr lang="en-US" dirty="0" smtClean="0"/>
+              <a:t>Admin </a:t>
+            </a:r>
+            <a:r>
+              <a:rPr lang="en-US" dirty="0"/>
+              <a:t>panel should be reduced in size and have the drop down functionalities removed</a:t>
+            </a:r>
+          </a:p>
+          <a:p>
+            <a:pPr lvl="1"/>
             <a:endParaRPr lang="en-US" dirty="0"/>
+          </a:p>
+          <a:p>
+            <a:pPr lvl="1"/>
+            <a:endParaRPr lang="en-US" dirty="0" smtClean="0"/>
           </a:p>
         </p:txBody>
       </p:sp>
     </p:spTree>
     <p:extLst>
       <p:ext uri="{BB962C8B-B14F-4D97-AF65-F5344CB8AC3E}">
-        <p14:creationId xmlns:p14="http://schemas.microsoft.com/office/powerpoint/2010/main" val="2453098138"/>
+        <p14:creationId xmlns:p14="http://schemas.microsoft.com/office/powerpoint/2010/main" val="874601741"/>
       </p:ext>
     </p:extLst>
   </p:cSld>
   <p:clrMapOvr>
     <a:masterClrMapping/>
   </p:clrMapOvr>
+  <p:timing>
+    <p:tnLst>
+      <p:par>
+        <p:cTn id="1" dur="indefinite" restart="never" nodeType="tmRoot"/>
+      </p:par>
+    </p:tnLst>
+  </p:timing>
 </p:sld>
 </file>
 
@@ -9362,90 +9174,130 @@
             <p:ph type="title"/>
           </p:nvPr>
         </p:nvSpPr>
-        <p:spPr>
-          <a:xfrm>
-            <a:off x="779463" y="381000"/>
-            <a:ext cx="8135937" cy="1044575"/>
-          </a:xfrm>
-        </p:spPr>
+        <p:spPr/>
         <p:txBody>
           <a:bodyPr/>
           <a:lstStyle/>
           <a:p>
             <a:r>
-              <a:rPr lang="en-US" dirty="0" smtClean="0"/>
-              <a:t>(Optional)</a:t>
-            </a:r>
-            <a:br>
-              <a:rPr lang="en-US" dirty="0" smtClean="0"/>
-            </a:br>
-            <a:r>
-              <a:rPr lang="en-US" dirty="0" err="1" smtClean="0"/>
-              <a:t>Statechart</a:t>
-            </a:r>
-            <a:r>
-              <a:rPr lang="en-US" dirty="0" smtClean="0"/>
-              <a:t> Diagrams</a:t>
-            </a:r>
+              <a:rPr lang="en-US" dirty="0"/>
+              <a:t>Manage Course information</a:t>
+            </a:r>
+          </a:p>
+        </p:txBody>
+      </p:sp>
+      <p:sp>
+        <p:nvSpPr>
+          <p:cNvPr id="3" name="Content Placeholder 2"/>
+          <p:cNvSpPr>
+            <a:spLocks noGrp="1"/>
+          </p:cNvSpPr>
+          <p:nvPr>
+            <p:ph idx="1"/>
+          </p:nvPr>
+        </p:nvSpPr>
+        <p:spPr/>
+        <p:txBody>
+          <a:bodyPr>
+            <a:normAutofit fontScale="92500" lnSpcReduction="10000"/>
+          </a:bodyPr>
+          <a:lstStyle/>
+          <a:p>
+            <a:r>
+              <a:rPr lang="en-US" dirty="0" smtClean="0"/>
+              <a:t>Description</a:t>
+            </a:r>
+          </a:p>
+          <a:p>
+            <a:pPr lvl="1"/>
+            <a:r>
+              <a:rPr lang="en-US" dirty="0" smtClean="0"/>
+              <a:t>A</a:t>
+            </a:r>
+            <a:r>
+              <a:rPr lang="en-US" dirty="0"/>
+              <a:t>s a PI/</a:t>
+            </a:r>
+            <a:r>
+              <a:rPr lang="en-US" dirty="0" err="1"/>
+              <a:t>CoPI</a:t>
+            </a:r>
+            <a:r>
+              <a:rPr lang="en-US" dirty="0"/>
+              <a:t>, I would like to be able to view, add, and remove a course, so that I can easily modify/update the information of current courses and users that are currently in a course.</a:t>
+            </a:r>
+            <a:endParaRPr lang="en-US" dirty="0" smtClean="0"/>
+          </a:p>
+          <a:p>
+            <a:r>
+              <a:rPr lang="en-US" dirty="0" smtClean="0"/>
+              <a:t>Acceptance Criteria</a:t>
+            </a:r>
+          </a:p>
+          <a:p>
+            <a:pPr lvl="1"/>
+            <a:r>
+              <a:rPr lang="en-US" dirty="0"/>
+              <a:t>After selecting the option to add/remove a course, PI/</a:t>
+            </a:r>
+            <a:r>
+              <a:rPr lang="en-US" dirty="0" err="1"/>
+              <a:t>CoPi</a:t>
+            </a:r>
+            <a:r>
+              <a:rPr lang="en-US" dirty="0"/>
+              <a:t> will be able to see the addition/removal of the course. If a user is associated with that course, that user is also updated in the system.</a:t>
+            </a:r>
+          </a:p>
+          <a:p>
+            <a:pPr lvl="1"/>
+            <a:r>
+              <a:rPr lang="en-US" dirty="0"/>
+              <a:t>After selecting the option to change the user’s properties and changing the course of that user, the  user’s updated course information will be displayed to the PI/</a:t>
+            </a:r>
+            <a:r>
+              <a:rPr lang="en-US" dirty="0" err="1"/>
+              <a:t>CoPI</a:t>
+            </a:r>
+            <a:r>
+              <a:rPr lang="en-US" dirty="0"/>
+              <a:t>.</a:t>
+            </a:r>
+          </a:p>
+          <a:p>
+            <a:pPr lvl="1"/>
+            <a:r>
+              <a:rPr lang="en-US" dirty="0"/>
+              <a:t>Need to have ability to filter users by their course.</a:t>
+            </a:r>
+          </a:p>
+          <a:p>
+            <a:pPr lvl="1"/>
             <a:endParaRPr lang="en-US" dirty="0"/>
           </a:p>
-        </p:txBody>
-      </p:sp>
-      <p:sp>
-        <p:nvSpPr>
-          <p:cNvPr id="3" name="Content Placeholder 2"/>
-          <p:cNvSpPr>
-            <a:spLocks noGrp="1"/>
-          </p:cNvSpPr>
-          <p:nvPr>
-            <p:ph idx="1"/>
-          </p:nvPr>
-        </p:nvSpPr>
-        <p:spPr/>
-        <p:txBody>
-          <a:bodyPr/>
-          <a:lstStyle/>
-          <a:p>
-            <a:r>
-              <a:rPr lang="en-US" dirty="0" smtClean="0"/>
-              <a:t>Show an interesting </a:t>
-            </a:r>
-            <a:r>
-              <a:rPr lang="en-US" dirty="0" err="1" smtClean="0"/>
-              <a:t>statechart</a:t>
-            </a:r>
-            <a:r>
-              <a:rPr lang="en-US" dirty="0" smtClean="0"/>
-              <a:t> diagram, if any.</a:t>
-            </a:r>
-          </a:p>
-          <a:p>
-            <a:r>
-              <a:rPr lang="en-US" dirty="0" smtClean="0"/>
-              <a:t>Do not mix a </a:t>
-            </a:r>
-            <a:r>
-              <a:rPr lang="en-US" dirty="0" err="1" smtClean="0"/>
-              <a:t>statechart</a:t>
-            </a:r>
-            <a:r>
-              <a:rPr lang="en-US" dirty="0" smtClean="0"/>
-              <a:t> diagram with an activity diagram; they are different!</a:t>
-            </a:r>
-            <a:endParaRPr lang="en-US" dirty="0"/>
+          <a:p>
+            <a:pPr lvl="1"/>
+            <a:endParaRPr lang="en-US" dirty="0" smtClean="0"/>
           </a:p>
         </p:txBody>
       </p:sp>
     </p:spTree>
     <p:extLst>
       <p:ext uri="{BB962C8B-B14F-4D97-AF65-F5344CB8AC3E}">
-        <p14:creationId xmlns:p14="http://schemas.microsoft.com/office/powerpoint/2010/main" val="3497134543"/>
+        <p14:creationId xmlns:p14="http://schemas.microsoft.com/office/powerpoint/2010/main" val="134887180"/>
       </p:ext>
     </p:extLst>
   </p:cSld>
   <p:clrMapOvr>
     <a:masterClrMapping/>
   </p:clrMapOvr>
+  <p:timing>
+    <p:tnLst>
+      <p:par>
+        <p:cTn id="1" dur="indefinite" restart="never" nodeType="tmRoot"/>
+      </p:par>
+    </p:tnLst>
+  </p:timing>
 </p:sld>
 </file>
 
@@ -9476,41 +9328,257 @@
             <p:ph type="title"/>
           </p:nvPr>
         </p:nvSpPr>
+        <p:spPr/>
+        <p:txBody>
+          <a:bodyPr/>
+          <a:lstStyle/>
+          <a:p>
+            <a:r>
+              <a:rPr lang="en-US" dirty="0" smtClean="0"/>
+              <a:t>Use Case Diagram</a:t>
+            </a:r>
+            <a:endParaRPr lang="en-US" dirty="0"/>
+          </a:p>
+        </p:txBody>
+      </p:sp>
+      <p:pic>
+        <p:nvPicPr>
+          <p:cNvPr id="4" name="Content Placeholder 3"/>
+          <p:cNvPicPr>
+            <a:picLocks noGrp="1" noChangeAspect="1"/>
+          </p:cNvPicPr>
+          <p:nvPr>
+            <p:ph idx="1"/>
+          </p:nvPr>
+        </p:nvPicPr>
+        <p:blipFill>
+          <a:blip r:embed="rId3">
+            <a:extLst>
+              <a:ext uri="{28A0092B-C50C-407E-A947-70E740481C1C}">
+                <a14:useLocalDpi xmlns:a14="http://schemas.microsoft.com/office/drawing/2010/main" val="0"/>
+              </a:ext>
+            </a:extLst>
+          </a:blip>
+          <a:stretch>
+            <a:fillRect/>
+          </a:stretch>
+        </p:blipFill>
         <p:spPr>
           <a:xfrm>
-            <a:off x="779463" y="381000"/>
-            <a:ext cx="8135937" cy="1044575"/>
+            <a:off x="2057400" y="2470150"/>
+            <a:ext cx="4930651" cy="3578699"/>
           </a:xfrm>
         </p:spPr>
-        <p:txBody>
-          <a:bodyPr/>
-          <a:lstStyle/>
-          <a:p>
-            <a:r>
-              <a:rPr lang="en-US" dirty="0"/>
-              <a:t>Main algorithm </a:t>
-            </a:r>
-          </a:p>
-        </p:txBody>
-      </p:sp>
-      <p:sp>
-        <p:nvSpPr>
-          <p:cNvPr id="3" name="Content Placeholder 2"/>
-          <p:cNvSpPr>
-            <a:spLocks noGrp="1"/>
-          </p:cNvSpPr>
-          <p:nvPr>
-            <p:ph idx="1"/>
-          </p:nvPr>
-        </p:nvSpPr>
-        <p:spPr/>
-        <p:txBody>
-          <a:bodyPr/>
-          <a:lstStyle/>
-          <a:p>
-            <a:r>
-              <a:rPr lang="en-US" dirty="0" smtClean="0"/>
-              <a:t>Show an interesting algorithm (pseudo code)</a:t>
+      </p:pic>
+      <p:sp>
+        <p:nvSpPr>
+          <p:cNvPr id="5" name="Text Placeholder 5"/>
+          <p:cNvSpPr txBox="1">
+            <a:spLocks/>
+          </p:cNvSpPr>
+          <p:nvPr/>
+        </p:nvSpPr>
+        <p:spPr bwMode="auto">
+          <a:xfrm>
+            <a:off x="533400" y="1654175"/>
+            <a:ext cx="8153400" cy="708025"/>
+          </a:xfrm>
+          <a:prstGeom prst="rect">
+            <a:avLst/>
+          </a:prstGeom>
+          <a:noFill/>
+          <a:ln>
+            <a:noFill/>
+          </a:ln>
+          <a:extLst>
+            <a:ext uri="{909E8E84-426E-40dd-AFC4-6F175D3DCCD1}">
+              <a14:hiddenFill xmlns="" xmlns:a14="http://schemas.microsoft.com/office/drawing/2010/main">
+                <a:solidFill>
+                  <a:srgbClr val="FFFFFF"/>
+                </a:solidFill>
+              </a14:hiddenFill>
+            </a:ext>
+            <a:ext uri="{91240B29-F687-4f45-9708-019B960494DF}">
+              <a14:hiddenLine xmlns="" xmlns:a14="http://schemas.microsoft.com/office/drawing/2010/main" w="9525">
+                <a:solidFill>
+                  <a:srgbClr val="000000"/>
+                </a:solidFill>
+                <a:miter lim="800000"/>
+                <a:headEnd/>
+                <a:tailEnd/>
+              </a14:hiddenLine>
+            </a:ext>
+          </a:extLst>
+        </p:spPr>
+        <p:txBody>
+          <a:bodyPr vert="horz" wrap="square" lIns="91440" tIns="45720" rIns="91440" bIns="45720" numCol="1" anchor="t" anchorCtr="0" compatLnSpc="1">
+            <a:prstTxWarp prst="textNoShape">
+              <a:avLst/>
+            </a:prstTxWarp>
+          </a:bodyPr>
+          <a:lstStyle>
+            <a:lvl1pPr marL="282575" indent="-282575" algn="l" rtl="0" eaLnBrk="0" fontAlgn="base" hangingPunct="0">
+              <a:spcBef>
+                <a:spcPts val="2000"/>
+              </a:spcBef>
+              <a:spcAft>
+                <a:spcPct val="0"/>
+              </a:spcAft>
+              <a:buFont typeface="Wingdings 2" pitchFamily="18" charset="2"/>
+              <a:buChar char=""/>
+              <a:defRPr sz="2200" kern="1200">
+                <a:solidFill>
+                  <a:srgbClr val="001D4D"/>
+                </a:solidFill>
+                <a:latin typeface="+mn-lt"/>
+                <a:ea typeface="ＭＳ Ｐゴシック" pitchFamily="-111" charset="-128"/>
+                <a:cs typeface="ＭＳ Ｐゴシック" pitchFamily="-111" charset="-128"/>
+              </a:defRPr>
+            </a:lvl1pPr>
+            <a:lvl2pPr marL="577850" indent="-295275" algn="l" rtl="0" eaLnBrk="0" fontAlgn="base" hangingPunct="0">
+              <a:spcBef>
+                <a:spcPts val="600"/>
+              </a:spcBef>
+              <a:spcAft>
+                <a:spcPct val="0"/>
+              </a:spcAft>
+              <a:buFont typeface="Wingdings 2" pitchFamily="18" charset="2"/>
+              <a:buChar char=""/>
+              <a:defRPr sz="2000" kern="1200">
+                <a:solidFill>
+                  <a:srgbClr val="001D4D"/>
+                </a:solidFill>
+                <a:latin typeface="+mn-lt"/>
+                <a:ea typeface="ＭＳ Ｐゴシック" pitchFamily="-111" charset="-128"/>
+                <a:cs typeface="+mn-cs"/>
+              </a:defRPr>
+            </a:lvl2pPr>
+            <a:lvl3pPr marL="860425" indent="-282575" algn="l" rtl="0" eaLnBrk="0" fontAlgn="base" hangingPunct="0">
+              <a:spcBef>
+                <a:spcPts val="600"/>
+              </a:spcBef>
+              <a:spcAft>
+                <a:spcPct val="0"/>
+              </a:spcAft>
+              <a:buFont typeface="Wingdings 2" pitchFamily="18" charset="2"/>
+              <a:buChar char=""/>
+              <a:defRPr kern="1200">
+                <a:solidFill>
+                  <a:srgbClr val="001D4D"/>
+                </a:solidFill>
+                <a:latin typeface="+mn-lt"/>
+                <a:ea typeface="ＭＳ Ｐゴシック" pitchFamily="-111" charset="-128"/>
+                <a:cs typeface="+mn-cs"/>
+              </a:defRPr>
+            </a:lvl3pPr>
+            <a:lvl4pPr marL="1143000" indent="-282575" algn="l" rtl="0" eaLnBrk="0" fontAlgn="base" hangingPunct="0">
+              <a:spcBef>
+                <a:spcPts val="600"/>
+              </a:spcBef>
+              <a:spcAft>
+                <a:spcPct val="0"/>
+              </a:spcAft>
+              <a:buFont typeface="Wingdings 2" pitchFamily="18" charset="2"/>
+              <a:buChar char=""/>
+              <a:defRPr kern="1200">
+                <a:solidFill>
+                  <a:srgbClr val="001D4D"/>
+                </a:solidFill>
+                <a:latin typeface="+mn-lt"/>
+                <a:ea typeface="ＭＳ Ｐゴシック" pitchFamily="-111" charset="-128"/>
+                <a:cs typeface="+mn-cs"/>
+              </a:defRPr>
+            </a:lvl4pPr>
+            <a:lvl5pPr marL="1425575" indent="-282575" algn="l" rtl="0" eaLnBrk="0" fontAlgn="base" hangingPunct="0">
+              <a:spcBef>
+                <a:spcPts val="600"/>
+              </a:spcBef>
+              <a:spcAft>
+                <a:spcPct val="0"/>
+              </a:spcAft>
+              <a:buFont typeface="Wingdings 2" pitchFamily="18" charset="2"/>
+              <a:buChar char=""/>
+              <a:defRPr kern="1200">
+                <a:solidFill>
+                  <a:srgbClr val="001D4D"/>
+                </a:solidFill>
+                <a:latin typeface="+mn-lt"/>
+                <a:ea typeface="ＭＳ Ｐゴシック" pitchFamily="-111" charset="-128"/>
+                <a:cs typeface="+mn-cs"/>
+              </a:defRPr>
+            </a:lvl5pPr>
+            <a:lvl6pPr marL="2514600" indent="-228600" algn="l" defTabSz="914400" rtl="0" eaLnBrk="1" latinLnBrk="0" hangingPunct="1">
+              <a:spcBef>
+                <a:spcPct val="20000"/>
+              </a:spcBef>
+              <a:buFont typeface="Arial" pitchFamily="34" charset="0"/>
+              <a:buChar char="•"/>
+              <a:defRPr sz="2000" kern="1200">
+                <a:solidFill>
+                  <a:schemeClr val="tx1"/>
+                </a:solidFill>
+                <a:latin typeface="+mn-lt"/>
+                <a:ea typeface="+mn-ea"/>
+                <a:cs typeface="+mn-cs"/>
+              </a:defRPr>
+            </a:lvl6pPr>
+            <a:lvl7pPr marL="2971800" indent="-228600" algn="l" defTabSz="914400" rtl="0" eaLnBrk="1" latinLnBrk="0" hangingPunct="1">
+              <a:spcBef>
+                <a:spcPct val="20000"/>
+              </a:spcBef>
+              <a:buFont typeface="Arial" pitchFamily="34" charset="0"/>
+              <a:buChar char="•"/>
+              <a:defRPr sz="2000" kern="1200">
+                <a:solidFill>
+                  <a:schemeClr val="tx1"/>
+                </a:solidFill>
+                <a:latin typeface="+mn-lt"/>
+                <a:ea typeface="+mn-ea"/>
+                <a:cs typeface="+mn-cs"/>
+              </a:defRPr>
+            </a:lvl7pPr>
+            <a:lvl8pPr marL="3429000" indent="-228600" algn="l" defTabSz="914400" rtl="0" eaLnBrk="1" latinLnBrk="0" hangingPunct="1">
+              <a:spcBef>
+                <a:spcPct val="20000"/>
+              </a:spcBef>
+              <a:buFont typeface="Arial" pitchFamily="34" charset="0"/>
+              <a:buChar char="•"/>
+              <a:defRPr sz="2000" kern="1200">
+                <a:solidFill>
+                  <a:schemeClr val="tx1"/>
+                </a:solidFill>
+                <a:latin typeface="+mn-lt"/>
+                <a:ea typeface="+mn-ea"/>
+                <a:cs typeface="+mn-cs"/>
+              </a:defRPr>
+            </a:lvl8pPr>
+            <a:lvl9pPr marL="3886200" indent="-228600" algn="l" defTabSz="914400" rtl="0" eaLnBrk="1" latinLnBrk="0" hangingPunct="1">
+              <a:spcBef>
+                <a:spcPct val="20000"/>
+              </a:spcBef>
+              <a:buFont typeface="Arial" pitchFamily="34" charset="0"/>
+              <a:buChar char="•"/>
+              <a:defRPr sz="2000" kern="1200">
+                <a:solidFill>
+                  <a:schemeClr val="tx1"/>
+                </a:solidFill>
+                <a:latin typeface="+mn-lt"/>
+                <a:ea typeface="+mn-ea"/>
+                <a:cs typeface="+mn-cs"/>
+              </a:defRPr>
+            </a:lvl9pPr>
+          </a:lstStyle>
+          <a:p>
+            <a:pPr marL="0" indent="0" algn="ctr" defTabSz="914400">
+              <a:buNone/>
+            </a:pPr>
+            <a:r>
+              <a:rPr lang="en-US" dirty="0" smtClean="0"/>
+              <a:t>Use Case Diagram for the Add Video User Story with five separate </a:t>
+            </a:r>
+            <a:r>
+              <a:rPr lang="en-US" smtClean="0"/>
+              <a:t>use cases.</a:t>
             </a:r>
             <a:endParaRPr lang="en-US" dirty="0"/>
           </a:p>
@@ -9519,13 +9587,20 @@
     </p:spTree>
     <p:extLst>
       <p:ext uri="{BB962C8B-B14F-4D97-AF65-F5344CB8AC3E}">
-        <p14:creationId xmlns:p14="http://schemas.microsoft.com/office/powerpoint/2010/main" val="35682116"/>
+        <p14:creationId xmlns:p14="http://schemas.microsoft.com/office/powerpoint/2010/main" val="2354238314"/>
       </p:ext>
     </p:extLst>
   </p:cSld>
   <p:clrMapOvr>
     <a:masterClrMapping/>
   </p:clrMapOvr>
+  <p:timing>
+    <p:tnLst>
+      <p:par>
+        <p:cTn id="1" dur="indefinite" restart="never" nodeType="tmRoot"/>
+      </p:par>
+    </p:tnLst>
+  </p:timing>
 </p:sld>
 </file>
 
@@ -9556,53 +9631,258 @@
             <p:ph type="title"/>
           </p:nvPr>
         </p:nvSpPr>
-        <p:spPr/>
+        <p:spPr>
+          <a:xfrm>
+            <a:off x="779463" y="381000"/>
+            <a:ext cx="8059737" cy="1044575"/>
+          </a:xfrm>
+        </p:spPr>
         <p:txBody>
           <a:bodyPr/>
           <a:lstStyle/>
           <a:p>
             <a:r>
-              <a:rPr lang="en-US" dirty="0"/>
-              <a:t>Test Suites and Test </a:t>
-            </a:r>
-            <a:r>
-              <a:rPr lang="en-US" dirty="0" smtClean="0"/>
-              <a:t>Cases</a:t>
+              <a:rPr lang="en-US" dirty="0" smtClean="0"/>
+              <a:t>Sequence Diagram for Adding Users</a:t>
             </a:r>
             <a:endParaRPr lang="en-US" dirty="0"/>
           </a:p>
         </p:txBody>
       </p:sp>
-      <p:sp>
-        <p:nvSpPr>
-          <p:cNvPr id="3" name="Content Placeholder 2"/>
-          <p:cNvSpPr>
-            <a:spLocks noGrp="1"/>
-          </p:cNvSpPr>
+      <p:pic>
+        <p:nvPicPr>
+          <p:cNvPr id="4" name="Content Placeholder 3"/>
+          <p:cNvPicPr>
+            <a:picLocks noGrp="1" noChangeAspect="1"/>
+          </p:cNvPicPr>
           <p:nvPr>
             <p:ph idx="1"/>
           </p:nvPr>
-        </p:nvSpPr>
-        <p:spPr/>
-        <p:txBody>
-          <a:bodyPr/>
-          <a:lstStyle/>
-          <a:p>
-            <a:r>
-              <a:rPr lang="en-US" dirty="0" smtClean="0"/>
-              <a:t>Sunny Day</a:t>
-            </a:r>
-          </a:p>
-          <a:p>
-            <a:r>
-              <a:rPr lang="en-US" dirty="0" smtClean="0"/>
-              <a:t>Rainy Day</a:t>
-            </a:r>
-          </a:p>
-          <a:p>
-            <a:r>
-              <a:rPr lang="en-US" dirty="0" smtClean="0"/>
-              <a:t>Automated test scripts, if any</a:t>
+        </p:nvPicPr>
+        <p:blipFill>
+          <a:blip r:embed="rId3">
+            <a:extLst>
+              <a:ext uri="{28A0092B-C50C-407E-A947-70E740481C1C}">
+                <a14:useLocalDpi xmlns:a14="http://schemas.microsoft.com/office/drawing/2010/main" val="0"/>
+              </a:ext>
+            </a:extLst>
+          </a:blip>
+          <a:stretch>
+            <a:fillRect/>
+          </a:stretch>
+        </p:blipFill>
+        <p:spPr>
+          <a:xfrm>
+            <a:off x="1828800" y="2133600"/>
+            <a:ext cx="5540628" cy="3827463"/>
+          </a:xfrm>
+        </p:spPr>
+      </p:pic>
+      <p:sp>
+        <p:nvSpPr>
+          <p:cNvPr id="5" name="Text Placeholder 5"/>
+          <p:cNvSpPr txBox="1">
+            <a:spLocks/>
+          </p:cNvSpPr>
+          <p:nvPr/>
+        </p:nvSpPr>
+        <p:spPr bwMode="auto">
+          <a:xfrm>
+            <a:off x="533400" y="1600200"/>
+            <a:ext cx="8153400" cy="533400"/>
+          </a:xfrm>
+          <a:prstGeom prst="rect">
+            <a:avLst/>
+          </a:prstGeom>
+          <a:noFill/>
+          <a:ln>
+            <a:noFill/>
+          </a:ln>
+          <a:extLst>
+            <a:ext uri="{909E8E84-426E-40dd-AFC4-6F175D3DCCD1}">
+              <a14:hiddenFill xmlns="" xmlns:a14="http://schemas.microsoft.com/office/drawing/2010/main">
+                <a:solidFill>
+                  <a:srgbClr val="FFFFFF"/>
+                </a:solidFill>
+              </a14:hiddenFill>
+            </a:ext>
+            <a:ext uri="{91240B29-F687-4f45-9708-019B960494DF}">
+              <a14:hiddenLine xmlns="" xmlns:a14="http://schemas.microsoft.com/office/drawing/2010/main" w="9525">
+                <a:solidFill>
+                  <a:srgbClr val="000000"/>
+                </a:solidFill>
+                <a:miter lim="800000"/>
+                <a:headEnd/>
+                <a:tailEnd/>
+              </a14:hiddenLine>
+            </a:ext>
+          </a:extLst>
+        </p:spPr>
+        <p:txBody>
+          <a:bodyPr vert="horz" wrap="square" lIns="91440" tIns="45720" rIns="91440" bIns="45720" numCol="1" anchor="t" anchorCtr="0" compatLnSpc="1">
+            <a:prstTxWarp prst="textNoShape">
+              <a:avLst/>
+            </a:prstTxWarp>
+          </a:bodyPr>
+          <a:lstStyle>
+            <a:lvl1pPr marL="282575" indent="-282575" algn="l" rtl="0" eaLnBrk="0" fontAlgn="base" hangingPunct="0">
+              <a:spcBef>
+                <a:spcPts val="2000"/>
+              </a:spcBef>
+              <a:spcAft>
+                <a:spcPct val="0"/>
+              </a:spcAft>
+              <a:buFont typeface="Wingdings 2" pitchFamily="18" charset="2"/>
+              <a:buChar char=""/>
+              <a:defRPr sz="2200" kern="1200">
+                <a:solidFill>
+                  <a:srgbClr val="001D4D"/>
+                </a:solidFill>
+                <a:latin typeface="+mn-lt"/>
+                <a:ea typeface="ＭＳ Ｐゴシック" pitchFamily="-111" charset="-128"/>
+                <a:cs typeface="ＭＳ Ｐゴシック" pitchFamily="-111" charset="-128"/>
+              </a:defRPr>
+            </a:lvl1pPr>
+            <a:lvl2pPr marL="577850" indent="-295275" algn="l" rtl="0" eaLnBrk="0" fontAlgn="base" hangingPunct="0">
+              <a:spcBef>
+                <a:spcPts val="600"/>
+              </a:spcBef>
+              <a:spcAft>
+                <a:spcPct val="0"/>
+              </a:spcAft>
+              <a:buFont typeface="Wingdings 2" pitchFamily="18" charset="2"/>
+              <a:buChar char=""/>
+              <a:defRPr sz="2000" kern="1200">
+                <a:solidFill>
+                  <a:srgbClr val="001D4D"/>
+                </a:solidFill>
+                <a:latin typeface="+mn-lt"/>
+                <a:ea typeface="ＭＳ Ｐゴシック" pitchFamily="-111" charset="-128"/>
+                <a:cs typeface="+mn-cs"/>
+              </a:defRPr>
+            </a:lvl2pPr>
+            <a:lvl3pPr marL="860425" indent="-282575" algn="l" rtl="0" eaLnBrk="0" fontAlgn="base" hangingPunct="0">
+              <a:spcBef>
+                <a:spcPts val="600"/>
+              </a:spcBef>
+              <a:spcAft>
+                <a:spcPct val="0"/>
+              </a:spcAft>
+              <a:buFont typeface="Wingdings 2" pitchFamily="18" charset="2"/>
+              <a:buChar char=""/>
+              <a:defRPr kern="1200">
+                <a:solidFill>
+                  <a:srgbClr val="001D4D"/>
+                </a:solidFill>
+                <a:latin typeface="+mn-lt"/>
+                <a:ea typeface="ＭＳ Ｐゴシック" pitchFamily="-111" charset="-128"/>
+                <a:cs typeface="+mn-cs"/>
+              </a:defRPr>
+            </a:lvl3pPr>
+            <a:lvl4pPr marL="1143000" indent="-282575" algn="l" rtl="0" eaLnBrk="0" fontAlgn="base" hangingPunct="0">
+              <a:spcBef>
+                <a:spcPts val="600"/>
+              </a:spcBef>
+              <a:spcAft>
+                <a:spcPct val="0"/>
+              </a:spcAft>
+              <a:buFont typeface="Wingdings 2" pitchFamily="18" charset="2"/>
+              <a:buChar char=""/>
+              <a:defRPr kern="1200">
+                <a:solidFill>
+                  <a:srgbClr val="001D4D"/>
+                </a:solidFill>
+                <a:latin typeface="+mn-lt"/>
+                <a:ea typeface="ＭＳ Ｐゴシック" pitchFamily="-111" charset="-128"/>
+                <a:cs typeface="+mn-cs"/>
+              </a:defRPr>
+            </a:lvl4pPr>
+            <a:lvl5pPr marL="1425575" indent="-282575" algn="l" rtl="0" eaLnBrk="0" fontAlgn="base" hangingPunct="0">
+              <a:spcBef>
+                <a:spcPts val="600"/>
+              </a:spcBef>
+              <a:spcAft>
+                <a:spcPct val="0"/>
+              </a:spcAft>
+              <a:buFont typeface="Wingdings 2" pitchFamily="18" charset="2"/>
+              <a:buChar char=""/>
+              <a:defRPr kern="1200">
+                <a:solidFill>
+                  <a:srgbClr val="001D4D"/>
+                </a:solidFill>
+                <a:latin typeface="+mn-lt"/>
+                <a:ea typeface="ＭＳ Ｐゴシック" pitchFamily="-111" charset="-128"/>
+                <a:cs typeface="+mn-cs"/>
+              </a:defRPr>
+            </a:lvl5pPr>
+            <a:lvl6pPr marL="2514600" indent="-228600" algn="l" defTabSz="914400" rtl="0" eaLnBrk="1" latinLnBrk="0" hangingPunct="1">
+              <a:spcBef>
+                <a:spcPct val="20000"/>
+              </a:spcBef>
+              <a:buFont typeface="Arial" pitchFamily="34" charset="0"/>
+              <a:buChar char="•"/>
+              <a:defRPr sz="2000" kern="1200">
+                <a:solidFill>
+                  <a:schemeClr val="tx1"/>
+                </a:solidFill>
+                <a:latin typeface="+mn-lt"/>
+                <a:ea typeface="+mn-ea"/>
+                <a:cs typeface="+mn-cs"/>
+              </a:defRPr>
+            </a:lvl6pPr>
+            <a:lvl7pPr marL="2971800" indent="-228600" algn="l" defTabSz="914400" rtl="0" eaLnBrk="1" latinLnBrk="0" hangingPunct="1">
+              <a:spcBef>
+                <a:spcPct val="20000"/>
+              </a:spcBef>
+              <a:buFont typeface="Arial" pitchFamily="34" charset="0"/>
+              <a:buChar char="•"/>
+              <a:defRPr sz="2000" kern="1200">
+                <a:solidFill>
+                  <a:schemeClr val="tx1"/>
+                </a:solidFill>
+                <a:latin typeface="+mn-lt"/>
+                <a:ea typeface="+mn-ea"/>
+                <a:cs typeface="+mn-cs"/>
+              </a:defRPr>
+            </a:lvl7pPr>
+            <a:lvl8pPr marL="3429000" indent="-228600" algn="l" defTabSz="914400" rtl="0" eaLnBrk="1" latinLnBrk="0" hangingPunct="1">
+              <a:spcBef>
+                <a:spcPct val="20000"/>
+              </a:spcBef>
+              <a:buFont typeface="Arial" pitchFamily="34" charset="0"/>
+              <a:buChar char="•"/>
+              <a:defRPr sz="2000" kern="1200">
+                <a:solidFill>
+                  <a:schemeClr val="tx1"/>
+                </a:solidFill>
+                <a:latin typeface="+mn-lt"/>
+                <a:ea typeface="+mn-ea"/>
+                <a:cs typeface="+mn-cs"/>
+              </a:defRPr>
+            </a:lvl8pPr>
+            <a:lvl9pPr marL="3886200" indent="-228600" algn="l" defTabSz="914400" rtl="0" eaLnBrk="1" latinLnBrk="0" hangingPunct="1">
+              <a:spcBef>
+                <a:spcPct val="20000"/>
+              </a:spcBef>
+              <a:buFont typeface="Arial" pitchFamily="34" charset="0"/>
+              <a:buChar char="•"/>
+              <a:defRPr sz="2000" kern="1200">
+                <a:solidFill>
+                  <a:schemeClr val="tx1"/>
+                </a:solidFill>
+                <a:latin typeface="+mn-lt"/>
+                <a:ea typeface="+mn-ea"/>
+                <a:cs typeface="+mn-cs"/>
+              </a:defRPr>
+            </a:lvl9pPr>
+          </a:lstStyle>
+          <a:p>
+            <a:pPr marL="0" indent="0" algn="ctr" defTabSz="914400">
+              <a:buNone/>
+            </a:pPr>
+            <a:r>
+              <a:rPr lang="en-US" dirty="0" smtClean="0"/>
+              <a:t>Shows the Admin Panel and uses all areas of the website.</a:t>
             </a:r>
             <a:endParaRPr lang="en-US" dirty="0"/>
           </a:p>
@@ -9611,13 +9891,20 @@
     </p:spTree>
     <p:extLst>
       <p:ext uri="{BB962C8B-B14F-4D97-AF65-F5344CB8AC3E}">
-        <p14:creationId xmlns:p14="http://schemas.microsoft.com/office/powerpoint/2010/main" val="2164104484"/>
+        <p14:creationId xmlns:p14="http://schemas.microsoft.com/office/powerpoint/2010/main" val="1062316422"/>
       </p:ext>
     </p:extLst>
   </p:cSld>
   <p:clrMapOvr>
     <a:masterClrMapping/>
   </p:clrMapOvr>
+  <p:timing>
+    <p:tnLst>
+      <p:par>
+        <p:cTn id="1" dur="indefinite" restart="never" nodeType="tmRoot"/>
+      </p:par>
+    </p:tnLst>
+  </p:timing>
 </p:sld>
 </file>
 
@@ -9655,7 +9942,7 @@
           <a:p>
             <a:r>
               <a:rPr lang="en-US" dirty="0" smtClean="0"/>
-              <a:t>Summary</a:t>
+              <a:t>System Design: Architecture</a:t>
             </a:r>
             <a:endParaRPr lang="en-US" dirty="0"/>
           </a:p>
@@ -9663,12 +9950,12 @@
       </p:sp>
       <p:sp>
         <p:nvSpPr>
-          <p:cNvPr id="3" name="Content Placeholder 2"/>
-          <p:cNvSpPr>
-            <a:spLocks noGrp="1"/>
-          </p:cNvSpPr>
-          <p:nvPr>
-            <p:ph idx="1"/>
+          <p:cNvPr id="6" name="Text Placeholder 5"/>
+          <p:cNvSpPr>
+            <a:spLocks noGrp="1"/>
+          </p:cNvSpPr>
+          <p:nvPr>
+            <p:ph type="body" idx="1"/>
           </p:nvPr>
         </p:nvSpPr>
         <p:spPr/>
@@ -9678,30 +9965,1334 @@
           <a:p>
             <a:r>
               <a:rPr lang="en-US" dirty="0" smtClean="0"/>
+              <a:t>3-tiered architecture</a:t>
+            </a:r>
+            <a:endParaRPr lang="en-US" dirty="0"/>
+          </a:p>
+        </p:txBody>
+      </p:sp>
+      <p:pic>
+        <p:nvPicPr>
+          <p:cNvPr id="25" name="Content Placeholder 24"/>
+          <p:cNvPicPr>
+            <a:picLocks noGrp="1" noChangeAspect="1"/>
+          </p:cNvPicPr>
+          <p:nvPr>
+            <p:ph sz="half" idx="2"/>
+          </p:nvPr>
+        </p:nvPicPr>
+        <p:blipFill>
+          <a:blip r:embed="rId3">
+            <a:extLst>
+              <a:ext uri="{28A0092B-C50C-407E-A947-70E740481C1C}">
+                <a14:useLocalDpi xmlns:a14="http://schemas.microsoft.com/office/drawing/2010/main" val="0"/>
+              </a:ext>
+            </a:extLst>
+          </a:blip>
+          <a:stretch>
+            <a:fillRect/>
+          </a:stretch>
+        </p:blipFill>
+        <p:spPr>
+          <a:xfrm>
+            <a:off x="991437" y="2362200"/>
+            <a:ext cx="3233652" cy="3686175"/>
+          </a:xfrm>
+        </p:spPr>
+      </p:pic>
+      <p:sp>
+        <p:nvSpPr>
+          <p:cNvPr id="8" name="Text Placeholder 7"/>
+          <p:cNvSpPr>
+            <a:spLocks noGrp="1"/>
+          </p:cNvSpPr>
+          <p:nvPr>
+            <p:ph type="body" sz="quarter" idx="3"/>
+          </p:nvPr>
+        </p:nvSpPr>
+        <p:spPr>
+          <a:xfrm>
+            <a:off x="4705350" y="1438835"/>
+            <a:ext cx="3829050" cy="789828"/>
+          </a:xfrm>
+        </p:spPr>
+        <p:txBody>
+          <a:bodyPr/>
+          <a:lstStyle/>
+          <a:p>
+            <a:r>
+              <a:rPr lang="en-US" dirty="0" smtClean="0"/>
+              <a:t>Model-View-Controller</a:t>
+            </a:r>
+            <a:endParaRPr lang="en-US" dirty="0"/>
+          </a:p>
+        </p:txBody>
+      </p:sp>
+      <p:pic>
+        <p:nvPicPr>
+          <p:cNvPr id="3" name="Content Placeholder 2"/>
+          <p:cNvPicPr>
+            <a:picLocks noGrp="1" noChangeAspect="1"/>
+          </p:cNvPicPr>
+          <p:nvPr>
+            <p:ph sz="quarter" idx="4"/>
+          </p:nvPr>
+        </p:nvPicPr>
+        <p:blipFill>
+          <a:blip r:embed="rId4">
+            <a:extLst>
+              <a:ext uri="{28A0092B-C50C-407E-A947-70E740481C1C}">
+                <a14:useLocalDpi xmlns:a14="http://schemas.microsoft.com/office/drawing/2010/main" val="0"/>
+              </a:ext>
+            </a:extLst>
+          </a:blip>
+          <a:stretch>
+            <a:fillRect/>
+          </a:stretch>
+        </p:blipFill>
+        <p:spPr>
+          <a:xfrm>
+            <a:off x="4739994" y="2362200"/>
+            <a:ext cx="3588311" cy="3686175"/>
+          </a:xfrm>
+        </p:spPr>
+      </p:pic>
+    </p:spTree>
+    <p:extLst>
+      <p:ext uri="{BB962C8B-B14F-4D97-AF65-F5344CB8AC3E}">
+        <p14:creationId xmlns:p14="http://schemas.microsoft.com/office/powerpoint/2010/main" val="4211570898"/>
+      </p:ext>
+    </p:extLst>
+  </p:cSld>
+  <p:clrMapOvr>
+    <a:masterClrMapping/>
+  </p:clrMapOvr>
+  <p:timing>
+    <p:tnLst>
+      <p:par>
+        <p:cTn id="1" dur="indefinite" restart="never" nodeType="tmRoot"/>
+      </p:par>
+    </p:tnLst>
+  </p:timing>
+</p:sld>
+</file>
+
+<file path=ppt/slides/slide15.xml><?xml version="1.0" encoding="utf-8"?>
+<p:sld xmlns:a="http://schemas.openxmlformats.org/drawingml/2006/main" xmlns:r="http://schemas.openxmlformats.org/officeDocument/2006/relationships" xmlns:p="http://schemas.openxmlformats.org/presentationml/2006/main">
+  <p:cSld>
+    <p:spTree>
+      <p:nvGrpSpPr>
+        <p:cNvPr id="1" name=""/>
+        <p:cNvGrpSpPr/>
+        <p:nvPr/>
+      </p:nvGrpSpPr>
+      <p:grpSpPr>
+        <a:xfrm>
+          <a:off x="0" y="0"/>
+          <a:ext cx="0" cy="0"/>
+          <a:chOff x="0" y="0"/>
+          <a:chExt cx="0" cy="0"/>
+        </a:xfrm>
+      </p:grpSpPr>
+      <p:sp>
+        <p:nvSpPr>
+          <p:cNvPr id="2" name="Title 1"/>
+          <p:cNvSpPr>
+            <a:spLocks noGrp="1"/>
+          </p:cNvSpPr>
+          <p:nvPr>
+            <p:ph type="title"/>
+          </p:nvPr>
+        </p:nvSpPr>
+        <p:spPr/>
+        <p:txBody>
+          <a:bodyPr/>
+          <a:lstStyle/>
+          <a:p>
+            <a:r>
+              <a:rPr lang="en-US" dirty="0" smtClean="0"/>
+              <a:t>System Design: Deployment</a:t>
+            </a:r>
+            <a:endParaRPr lang="en-US" dirty="0"/>
+          </a:p>
+        </p:txBody>
+      </p:sp>
+      <p:pic>
+        <p:nvPicPr>
+          <p:cNvPr id="4" name="Content Placeholder 3"/>
+          <p:cNvPicPr>
+            <a:picLocks noGrp="1" noChangeAspect="1"/>
+          </p:cNvPicPr>
+          <p:nvPr>
+            <p:ph idx="1"/>
+          </p:nvPr>
+        </p:nvPicPr>
+        <p:blipFill>
+          <a:blip r:embed="rId3">
+            <a:extLst>
+              <a:ext uri="{28A0092B-C50C-407E-A947-70E740481C1C}">
+                <a14:useLocalDpi xmlns:a14="http://schemas.microsoft.com/office/drawing/2010/main" val="0"/>
+              </a:ext>
+            </a:extLst>
+          </a:blip>
+          <a:stretch>
+            <a:fillRect/>
+          </a:stretch>
+        </p:blipFill>
+        <p:spPr>
+          <a:xfrm>
+            <a:off x="1599406" y="2092039"/>
+            <a:ext cx="5943600" cy="3681984"/>
+          </a:xfrm>
+        </p:spPr>
+      </p:pic>
+    </p:spTree>
+    <p:extLst>
+      <p:ext uri="{BB962C8B-B14F-4D97-AF65-F5344CB8AC3E}">
+        <p14:creationId xmlns:p14="http://schemas.microsoft.com/office/powerpoint/2010/main" val="2858691249"/>
+      </p:ext>
+    </p:extLst>
+  </p:cSld>
+  <p:clrMapOvr>
+    <a:masterClrMapping/>
+  </p:clrMapOvr>
+  <p:timing>
+    <p:tnLst>
+      <p:par>
+        <p:cTn id="1" dur="indefinite" restart="never" nodeType="tmRoot"/>
+      </p:par>
+    </p:tnLst>
+  </p:timing>
+</p:sld>
+</file>
+
+<file path=ppt/slides/slide16.xml><?xml version="1.0" encoding="utf-8"?>
+<p:sld xmlns:a="http://schemas.openxmlformats.org/drawingml/2006/main" xmlns:r="http://schemas.openxmlformats.org/officeDocument/2006/relationships" xmlns:p="http://schemas.openxmlformats.org/presentationml/2006/main">
+  <p:cSld>
+    <p:spTree>
+      <p:nvGrpSpPr>
+        <p:cNvPr id="1" name=""/>
+        <p:cNvGrpSpPr/>
+        <p:nvPr/>
+      </p:nvGrpSpPr>
+      <p:grpSpPr>
+        <a:xfrm>
+          <a:off x="0" y="0"/>
+          <a:ext cx="0" cy="0"/>
+          <a:chOff x="0" y="0"/>
+          <a:chExt cx="0" cy="0"/>
+        </a:xfrm>
+      </p:grpSpPr>
+      <p:sp>
+        <p:nvSpPr>
+          <p:cNvPr id="2" name="Title 1"/>
+          <p:cNvSpPr>
+            <a:spLocks noGrp="1"/>
+          </p:cNvSpPr>
+          <p:nvPr>
+            <p:ph type="title"/>
+          </p:nvPr>
+        </p:nvSpPr>
+        <p:spPr/>
+        <p:txBody>
+          <a:bodyPr/>
+          <a:lstStyle/>
+          <a:p>
+            <a:r>
+              <a:rPr lang="en-US" dirty="0" smtClean="0"/>
+              <a:t>Minimal Class Diagram</a:t>
+            </a:r>
+            <a:endParaRPr lang="en-US" dirty="0"/>
+          </a:p>
+        </p:txBody>
+      </p:sp>
+      <p:pic>
+        <p:nvPicPr>
+          <p:cNvPr id="4" name="Content Placeholder 3"/>
+          <p:cNvPicPr>
+            <a:picLocks noGrp="1" noChangeAspect="1"/>
+          </p:cNvPicPr>
+          <p:nvPr>
+            <p:ph idx="1"/>
+          </p:nvPr>
+        </p:nvPicPr>
+        <p:blipFill>
+          <a:blip r:embed="rId3">
+            <a:extLst>
+              <a:ext uri="{28A0092B-C50C-407E-A947-70E740481C1C}">
+                <a14:useLocalDpi xmlns:a14="http://schemas.microsoft.com/office/drawing/2010/main" val="0"/>
+              </a:ext>
+            </a:extLst>
+          </a:blip>
+          <a:stretch>
+            <a:fillRect/>
+          </a:stretch>
+        </p:blipFill>
+        <p:spPr>
+          <a:xfrm>
+            <a:off x="2180719" y="1600200"/>
+            <a:ext cx="4546724" cy="4437063"/>
+          </a:xfrm>
+        </p:spPr>
+      </p:pic>
+    </p:spTree>
+    <p:extLst>
+      <p:ext uri="{BB962C8B-B14F-4D97-AF65-F5344CB8AC3E}">
+        <p14:creationId xmlns:p14="http://schemas.microsoft.com/office/powerpoint/2010/main" val="2453098138"/>
+      </p:ext>
+    </p:extLst>
+  </p:cSld>
+  <p:clrMapOvr>
+    <a:masterClrMapping/>
+  </p:clrMapOvr>
+  <p:timing>
+    <p:tnLst>
+      <p:par>
+        <p:cTn id="1" dur="indefinite" restart="never" nodeType="tmRoot"/>
+      </p:par>
+    </p:tnLst>
+  </p:timing>
+</p:sld>
+</file>
+
+<file path=ppt/slides/slide17.xml><?xml version="1.0" encoding="utf-8"?>
+<p:sld xmlns:a="http://schemas.openxmlformats.org/drawingml/2006/main" xmlns:r="http://schemas.openxmlformats.org/officeDocument/2006/relationships" xmlns:p="http://schemas.openxmlformats.org/presentationml/2006/main">
+  <p:cSld>
+    <p:spTree>
+      <p:nvGrpSpPr>
+        <p:cNvPr id="1" name=""/>
+        <p:cNvGrpSpPr/>
+        <p:nvPr/>
+      </p:nvGrpSpPr>
+      <p:grpSpPr>
+        <a:xfrm>
+          <a:off x="0" y="0"/>
+          <a:ext cx="0" cy="0"/>
+          <a:chOff x="0" y="0"/>
+          <a:chExt cx="0" cy="0"/>
+        </a:xfrm>
+      </p:grpSpPr>
+      <p:sp>
+        <p:nvSpPr>
+          <p:cNvPr id="2" name="Title 1"/>
+          <p:cNvSpPr>
+            <a:spLocks noGrp="1"/>
+          </p:cNvSpPr>
+          <p:nvPr>
+            <p:ph type="title"/>
+          </p:nvPr>
+        </p:nvSpPr>
+        <p:spPr/>
+        <p:txBody>
+          <a:bodyPr>
+            <a:normAutofit fontScale="90000"/>
+          </a:bodyPr>
+          <a:lstStyle/>
+          <a:p>
+            <a:r>
+              <a:rPr lang="en-US" dirty="0" smtClean="0"/>
+              <a:t>Sample Test Case </a:t>
+            </a:r>
+            <a:r>
+              <a:rPr lang="en-US" dirty="0"/>
+              <a:t>- VIP-1313-U2 (Rainy Day</a:t>
+            </a:r>
+            <a:r>
+              <a:rPr lang="en-US" dirty="0" smtClean="0"/>
+              <a:t>)</a:t>
+            </a:r>
+            <a:endParaRPr lang="en-US" dirty="0"/>
+          </a:p>
+        </p:txBody>
+      </p:sp>
+      <p:sp>
+        <p:nvSpPr>
+          <p:cNvPr id="7" name="Content Placeholder 6"/>
+          <p:cNvSpPr>
+            <a:spLocks noGrp="1"/>
+          </p:cNvSpPr>
+          <p:nvPr>
+            <p:ph sz="half" idx="1"/>
+          </p:nvPr>
+        </p:nvSpPr>
+        <p:spPr/>
+        <p:txBody>
+          <a:bodyPr>
+            <a:normAutofit fontScale="85000" lnSpcReduction="10000"/>
+          </a:bodyPr>
+          <a:lstStyle/>
+          <a:p>
+            <a:r>
+              <a:rPr lang="en-US" dirty="0"/>
+              <a:t>Description: Admin edits project properties</a:t>
+            </a:r>
+            <a:r>
+              <a:rPr lang="en-US" dirty="0"/>
+              <a:t> </a:t>
+            </a:r>
+            <a:endParaRPr lang="en-US" dirty="0" smtClean="0"/>
+          </a:p>
+          <a:p>
+            <a:pPr lvl="0"/>
+            <a:r>
+              <a:rPr lang="en-US" dirty="0"/>
+              <a:t>Summary of Test: </a:t>
+            </a:r>
+          </a:p>
+          <a:p>
+            <a:pPr marL="625475" lvl="1" indent="-342900">
+              <a:buFont typeface="+mj-lt"/>
+              <a:buAutoNum type="arabicPeriod"/>
+            </a:pPr>
+            <a:r>
+              <a:rPr lang="en-US" dirty="0"/>
+              <a:t>Tester selects ‘edit project properties’ button</a:t>
+            </a:r>
+            <a:endParaRPr lang="en-US" dirty="0"/>
+          </a:p>
+          <a:p>
+            <a:pPr marL="625475" lvl="1" indent="-342900">
+              <a:buFont typeface="+mj-lt"/>
+              <a:buAutoNum type="arabicPeriod"/>
+            </a:pPr>
+            <a:r>
+              <a:rPr lang="en-US" dirty="0"/>
+              <a:t>Tester modifies project with project data into edit project dialog</a:t>
+            </a:r>
+            <a:endParaRPr lang="en-US" dirty="0"/>
+          </a:p>
+          <a:p>
+            <a:pPr marL="625475" lvl="1" indent="-342900">
+              <a:buFont typeface="+mj-lt"/>
+              <a:buAutoNum type="arabicPeriod"/>
+            </a:pPr>
+            <a:r>
+              <a:rPr lang="en-US" dirty="0"/>
+              <a:t>Tester selects ‘save changes’ button</a:t>
+            </a:r>
+            <a:r>
+              <a:rPr lang="en-US" dirty="0"/>
+              <a:t> </a:t>
+            </a:r>
+            <a:endParaRPr lang="en-US" dirty="0" smtClean="0"/>
+          </a:p>
+          <a:p>
+            <a:pPr marL="330200" indent="-342900"/>
+            <a:r>
+              <a:rPr lang="en-US" dirty="0"/>
+              <a:t>Pre-Condition</a:t>
+            </a:r>
+            <a:r>
+              <a:rPr lang="en-US" dirty="0"/>
+              <a:t> </a:t>
+            </a:r>
+            <a:endParaRPr lang="en-US" dirty="0" smtClean="0"/>
+          </a:p>
+          <a:p>
+            <a:pPr lvl="1"/>
+            <a:r>
+              <a:rPr lang="en-US" dirty="0"/>
+              <a:t>User with Pi/</a:t>
+            </a:r>
+            <a:r>
+              <a:rPr lang="en-US" dirty="0" err="1"/>
+              <a:t>CoPi</a:t>
+            </a:r>
+            <a:r>
+              <a:rPr lang="en-US" dirty="0"/>
+              <a:t> privileges has logged into the VIP website</a:t>
+            </a:r>
+            <a:endParaRPr lang="en-US" dirty="0"/>
+          </a:p>
+          <a:p>
+            <a:pPr lvl="1"/>
+            <a:r>
+              <a:rPr lang="en-US" dirty="0"/>
+              <a:t>User is at the admin panel page - project maintenance </a:t>
+            </a:r>
+            <a:r>
+              <a:rPr lang="en-US" dirty="0" smtClean="0"/>
+              <a:t>tab</a:t>
+            </a:r>
+          </a:p>
+          <a:p>
+            <a:pPr marL="330200" indent="-342900">
+              <a:buFont typeface="+mj-lt"/>
+              <a:buAutoNum type="arabicPeriod"/>
+            </a:pPr>
+            <a:endParaRPr lang="en-US" dirty="0"/>
+          </a:p>
+        </p:txBody>
+      </p:sp>
+      <p:sp>
+        <p:nvSpPr>
+          <p:cNvPr id="6" name="Text Placeholder 5"/>
+          <p:cNvSpPr>
+            <a:spLocks noGrp="1"/>
+          </p:cNvSpPr>
+          <p:nvPr>
+            <p:ph sz="half" idx="2"/>
+          </p:nvPr>
+        </p:nvSpPr>
+        <p:spPr/>
+        <p:txBody>
+          <a:bodyPr>
+            <a:normAutofit fontScale="85000" lnSpcReduction="10000"/>
+          </a:bodyPr>
+          <a:lstStyle/>
+          <a:p>
+            <a:r>
+              <a:rPr lang="en-US" dirty="0" smtClean="0"/>
+              <a:t>E</a:t>
+            </a:r>
+            <a:r>
+              <a:rPr lang="en-US" dirty="0"/>
+              <a:t>xpected Results</a:t>
+            </a:r>
+            <a:r>
+              <a:rPr lang="en-US" dirty="0"/>
+              <a:t> </a:t>
+            </a:r>
+            <a:endParaRPr lang="en-US" dirty="0" smtClean="0"/>
+          </a:p>
+          <a:p>
+            <a:pPr lvl="1"/>
+            <a:r>
+              <a:rPr lang="en-US" dirty="0" smtClean="0"/>
+              <a:t>Project </a:t>
+            </a:r>
+            <a:r>
+              <a:rPr lang="en-US" dirty="0"/>
+              <a:t>will not be updated in the database</a:t>
+            </a:r>
+            <a:endParaRPr lang="en-US" dirty="0"/>
+          </a:p>
+          <a:p>
+            <a:pPr lvl="1"/>
+            <a:r>
+              <a:rPr lang="en-US" dirty="0"/>
+              <a:t>Projects panel table will not be updated</a:t>
+            </a:r>
+            <a:endParaRPr lang="en-US" dirty="0"/>
+          </a:p>
+          <a:p>
+            <a:pPr lvl="1"/>
+            <a:r>
+              <a:rPr lang="en-US" dirty="0"/>
+              <a:t>Tester will be notified of </a:t>
+            </a:r>
+            <a:r>
+              <a:rPr lang="en-US" dirty="0" smtClean="0"/>
+              <a:t>error</a:t>
+            </a:r>
+          </a:p>
+          <a:p>
+            <a:pPr lvl="0"/>
+            <a:r>
+              <a:rPr lang="en-US" dirty="0"/>
+              <a:t>Actual Result: </a:t>
+            </a:r>
+          </a:p>
+          <a:p>
+            <a:pPr lvl="1"/>
+            <a:r>
+              <a:rPr lang="en-US" dirty="0"/>
+              <a:t>Project will not be updated in the database</a:t>
+            </a:r>
+            <a:endParaRPr lang="en-US" dirty="0"/>
+          </a:p>
+          <a:p>
+            <a:pPr lvl="1"/>
+            <a:r>
+              <a:rPr lang="en-US" dirty="0"/>
+              <a:t>Projects panel table will not be updated</a:t>
+            </a:r>
+            <a:endParaRPr lang="en-US" dirty="0"/>
+          </a:p>
+          <a:p>
+            <a:pPr lvl="1"/>
+            <a:r>
+              <a:rPr lang="en-US" dirty="0"/>
+              <a:t>Tester will be notified of </a:t>
+            </a:r>
+            <a:r>
+              <a:rPr lang="en-US" dirty="0" smtClean="0"/>
+              <a:t>error</a:t>
+            </a:r>
+          </a:p>
+          <a:p>
+            <a:r>
+              <a:rPr lang="en-US" dirty="0"/>
+              <a:t>Status (Fail/Pass): </a:t>
+            </a:r>
+            <a:r>
+              <a:rPr lang="en-US" dirty="0" smtClean="0"/>
+              <a:t>PASS</a:t>
+            </a:r>
+            <a:endParaRPr lang="en-US" dirty="0"/>
+          </a:p>
+          <a:p>
+            <a:pPr lvl="1"/>
+            <a:endParaRPr lang="en-US" dirty="0"/>
+          </a:p>
+        </p:txBody>
+      </p:sp>
+    </p:spTree>
+    <p:extLst>
+      <p:ext uri="{BB962C8B-B14F-4D97-AF65-F5344CB8AC3E}">
+        <p14:creationId xmlns:p14="http://schemas.microsoft.com/office/powerpoint/2010/main" val="2164104484"/>
+      </p:ext>
+    </p:extLst>
+  </p:cSld>
+  <p:clrMapOvr>
+    <a:masterClrMapping/>
+  </p:clrMapOvr>
+  <p:timing>
+    <p:tnLst>
+      <p:par>
+        <p:cTn id="1" dur="indefinite" restart="never" nodeType="tmRoot"/>
+      </p:par>
+    </p:tnLst>
+  </p:timing>
+</p:sld>
+</file>
+
+<file path=ppt/slides/slide18.xml><?xml version="1.0" encoding="utf-8"?>
+<p:sld xmlns:a="http://schemas.openxmlformats.org/drawingml/2006/main" xmlns:r="http://schemas.openxmlformats.org/officeDocument/2006/relationships" xmlns:p="http://schemas.openxmlformats.org/presentationml/2006/main">
+  <p:cSld>
+    <p:spTree>
+      <p:nvGrpSpPr>
+        <p:cNvPr id="1" name=""/>
+        <p:cNvGrpSpPr/>
+        <p:nvPr/>
+      </p:nvGrpSpPr>
+      <p:grpSpPr>
+        <a:xfrm>
+          <a:off x="0" y="0"/>
+          <a:ext cx="0" cy="0"/>
+          <a:chOff x="0" y="0"/>
+          <a:chExt cx="0" cy="0"/>
+        </a:xfrm>
+      </p:grpSpPr>
+      <p:sp>
+        <p:nvSpPr>
+          <p:cNvPr id="2" name="Title 1"/>
+          <p:cNvSpPr>
+            <a:spLocks noGrp="1"/>
+          </p:cNvSpPr>
+          <p:nvPr>
+            <p:ph type="title"/>
+          </p:nvPr>
+        </p:nvSpPr>
+        <p:spPr/>
+        <p:txBody>
+          <a:bodyPr>
+            <a:normAutofit fontScale="90000"/>
+          </a:bodyPr>
+          <a:lstStyle/>
+          <a:p>
+            <a:r>
+              <a:rPr lang="en-US" dirty="0" smtClean="0"/>
+              <a:t>Sample Test Case </a:t>
+            </a:r>
+            <a:r>
+              <a:rPr lang="en-US" dirty="0"/>
+              <a:t>- </a:t>
+            </a:r>
+            <a:r>
+              <a:rPr lang="en-US" dirty="0" smtClean="0"/>
+              <a:t>VIP-1313-U3 (Sunny Day)</a:t>
+            </a:r>
+            <a:endParaRPr lang="en-US" dirty="0"/>
+          </a:p>
+        </p:txBody>
+      </p:sp>
+      <p:sp>
+        <p:nvSpPr>
+          <p:cNvPr id="7" name="Content Placeholder 6"/>
+          <p:cNvSpPr>
+            <a:spLocks noGrp="1"/>
+          </p:cNvSpPr>
+          <p:nvPr>
+            <p:ph sz="half" idx="1"/>
+          </p:nvPr>
+        </p:nvSpPr>
+        <p:spPr/>
+        <p:txBody>
+          <a:bodyPr>
+            <a:normAutofit fontScale="62500" lnSpcReduction="20000"/>
+          </a:bodyPr>
+          <a:lstStyle/>
+          <a:p>
+            <a:r>
+              <a:rPr lang="en-US" dirty="0"/>
+              <a:t>Description: Admin adds/removes project’s users</a:t>
+            </a:r>
+            <a:r>
+              <a:rPr lang="en-US" dirty="0"/>
+              <a:t> </a:t>
+            </a:r>
+            <a:endParaRPr lang="en-US" dirty="0" smtClean="0"/>
+          </a:p>
+          <a:p>
+            <a:r>
+              <a:rPr lang="en-US" dirty="0" smtClean="0"/>
+              <a:t>Summary </a:t>
+            </a:r>
+            <a:r>
+              <a:rPr lang="en-US" dirty="0"/>
+              <a:t>of Test: </a:t>
+            </a:r>
+          </a:p>
+          <a:p>
+            <a:pPr marL="625475" lvl="1" indent="-342900">
+              <a:buFont typeface="+mj-lt"/>
+              <a:buAutoNum type="arabicPeriod"/>
+            </a:pPr>
+            <a:r>
+              <a:rPr lang="en-US" dirty="0"/>
+              <a:t>Tester selects ‘add/remove users’ button</a:t>
+            </a:r>
+            <a:endParaRPr lang="en-US" dirty="0"/>
+          </a:p>
+          <a:p>
+            <a:pPr marL="625475" lvl="1" indent="-342900">
+              <a:buFont typeface="+mj-lt"/>
+              <a:buAutoNum type="arabicPeriod"/>
+            </a:pPr>
+            <a:r>
+              <a:rPr lang="en-US" dirty="0"/>
+              <a:t>Tester finds and selects user ‘</a:t>
+            </a:r>
+            <a:r>
+              <a:rPr lang="en-US" dirty="0" err="1"/>
+              <a:t>testF</a:t>
+            </a:r>
+            <a:r>
+              <a:rPr lang="en-US" dirty="0"/>
+              <a:t>’ in add user</a:t>
+            </a:r>
+            <a:endParaRPr lang="en-US" dirty="0"/>
+          </a:p>
+          <a:p>
+            <a:pPr marL="625475" lvl="1" indent="-342900">
+              <a:buFont typeface="+mj-lt"/>
+              <a:buAutoNum type="arabicPeriod"/>
+            </a:pPr>
+            <a:r>
+              <a:rPr lang="en-US" dirty="0"/>
+              <a:t>Tester selects ‘add user’ button</a:t>
+            </a:r>
+            <a:endParaRPr lang="en-US" dirty="0"/>
+          </a:p>
+          <a:p>
+            <a:pPr marL="625475" lvl="1" indent="-342900">
+              <a:buFont typeface="+mj-lt"/>
+              <a:buAutoNum type="arabicPeriod"/>
+            </a:pPr>
+            <a:r>
+              <a:rPr lang="en-US" dirty="0"/>
+              <a:t>Tester selects ‘remove user’ button for a user other than ‘</a:t>
+            </a:r>
+            <a:r>
+              <a:rPr lang="en-US" dirty="0" err="1"/>
+              <a:t>testF</a:t>
+            </a:r>
+            <a:r>
+              <a:rPr lang="en-US" dirty="0"/>
+              <a:t>’</a:t>
+            </a:r>
+            <a:endParaRPr lang="en-US" dirty="0"/>
+          </a:p>
+          <a:p>
+            <a:pPr marL="625475" lvl="1" indent="-342900">
+              <a:buFont typeface="+mj-lt"/>
+              <a:buAutoNum type="arabicPeriod"/>
+            </a:pPr>
+            <a:r>
+              <a:rPr lang="en-US" dirty="0"/>
+              <a:t>Tester selects ‘save changes’ button</a:t>
+            </a:r>
+            <a:r>
+              <a:rPr lang="en-US" dirty="0"/>
+              <a:t> </a:t>
+            </a:r>
+            <a:endParaRPr lang="en-US" dirty="0" smtClean="0"/>
+          </a:p>
+          <a:p>
+            <a:r>
+              <a:rPr lang="en-US" dirty="0" smtClean="0"/>
+              <a:t>Pre-Condition </a:t>
+            </a:r>
+          </a:p>
+          <a:p>
+            <a:pPr marL="752475" lvl="1" indent="-457200">
+              <a:buFont typeface="+mj-lt"/>
+              <a:buAutoNum type="arabicPeriod"/>
+            </a:pPr>
+            <a:r>
+              <a:rPr lang="en-US" dirty="0"/>
+              <a:t>User with Pi/</a:t>
+            </a:r>
+            <a:r>
+              <a:rPr lang="en-US" dirty="0" err="1"/>
+              <a:t>CoPi</a:t>
+            </a:r>
+            <a:r>
+              <a:rPr lang="en-US" dirty="0"/>
+              <a:t> privileges has logged into the VIP website</a:t>
+            </a:r>
+            <a:endParaRPr lang="en-US" dirty="0"/>
+          </a:p>
+          <a:p>
+            <a:pPr marL="752475" lvl="1" indent="-457200">
+              <a:buFont typeface="+mj-lt"/>
+              <a:buAutoNum type="arabicPeriod"/>
+            </a:pPr>
+            <a:r>
+              <a:rPr lang="en-US" dirty="0"/>
+              <a:t>User is at the admin panel page - project maintenance tab</a:t>
+            </a:r>
+            <a:endParaRPr lang="en-US" dirty="0"/>
+          </a:p>
+          <a:p>
+            <a:pPr marL="752475" lvl="1" indent="-457200">
+              <a:buFont typeface="+mj-lt"/>
+              <a:buAutoNum type="arabicPeriod"/>
+            </a:pPr>
+            <a:r>
+              <a:rPr lang="en-US" dirty="0"/>
+              <a:t>Project selected already has users assigned to it as current members</a:t>
+            </a:r>
+            <a:endParaRPr lang="en-US" dirty="0"/>
+          </a:p>
+          <a:p>
+            <a:pPr marL="752475" lvl="1" indent="-457200">
+              <a:buFont typeface="+mj-lt"/>
+              <a:buAutoNum type="arabicPeriod"/>
+            </a:pPr>
+            <a:r>
+              <a:rPr lang="en-US" dirty="0"/>
+              <a:t>Test VIP-1300-U1 has been </a:t>
+            </a:r>
+            <a:r>
+              <a:rPr lang="en-US" dirty="0" smtClean="0"/>
+              <a:t>executed</a:t>
+            </a:r>
+            <a:endParaRPr lang="en-US" dirty="0"/>
+          </a:p>
+        </p:txBody>
+      </p:sp>
+      <p:sp>
+        <p:nvSpPr>
+          <p:cNvPr id="6" name="Text Placeholder 5"/>
+          <p:cNvSpPr>
+            <a:spLocks noGrp="1"/>
+          </p:cNvSpPr>
+          <p:nvPr>
+            <p:ph sz="half" idx="2"/>
+          </p:nvPr>
+        </p:nvSpPr>
+        <p:spPr/>
+        <p:txBody>
+          <a:bodyPr>
+            <a:normAutofit fontScale="62500" lnSpcReduction="20000"/>
+          </a:bodyPr>
+          <a:lstStyle/>
+          <a:p>
+            <a:r>
+              <a:rPr lang="en-US" dirty="0" smtClean="0"/>
+              <a:t>E</a:t>
+            </a:r>
+            <a:r>
+              <a:rPr lang="en-US" dirty="0"/>
+              <a:t>xpected Results</a:t>
+            </a:r>
+            <a:r>
+              <a:rPr lang="en-US" dirty="0"/>
+              <a:t> </a:t>
+            </a:r>
+            <a:endParaRPr lang="en-US" dirty="0" smtClean="0"/>
+          </a:p>
+          <a:p>
+            <a:pPr lvl="1"/>
+            <a:r>
+              <a:rPr lang="en-US" dirty="0"/>
+              <a:t>Project will be updated in the database</a:t>
+            </a:r>
+            <a:endParaRPr lang="en-US" dirty="0"/>
+          </a:p>
+          <a:p>
+            <a:pPr lvl="1"/>
+            <a:r>
+              <a:rPr lang="en-US" dirty="0"/>
+              <a:t>Projects panel table will be </a:t>
+            </a:r>
+            <a:r>
+              <a:rPr lang="en-US" dirty="0" smtClean="0"/>
+              <a:t>updated</a:t>
+            </a:r>
+          </a:p>
+          <a:p>
+            <a:pPr lvl="1"/>
+            <a:r>
+              <a:rPr lang="en-US" dirty="0"/>
+              <a:t>Users will be updated in the database</a:t>
+            </a:r>
+            <a:endParaRPr lang="en-US" dirty="0"/>
+          </a:p>
+          <a:p>
+            <a:pPr lvl="1"/>
+            <a:r>
+              <a:rPr lang="en-US" dirty="0"/>
+              <a:t>Users panel table will be updated</a:t>
+            </a:r>
+            <a:endParaRPr lang="en-US" dirty="0"/>
+          </a:p>
+          <a:p>
+            <a:pPr lvl="1"/>
+            <a:r>
+              <a:rPr lang="en-US" dirty="0"/>
+              <a:t>Tester will be notified of </a:t>
+            </a:r>
+            <a:r>
+              <a:rPr lang="en-US" dirty="0" smtClean="0"/>
+              <a:t>success</a:t>
+            </a:r>
+            <a:endParaRPr lang="en-US" dirty="0"/>
+          </a:p>
+          <a:p>
+            <a:pPr lvl="0"/>
+            <a:r>
+              <a:rPr lang="en-US" dirty="0" smtClean="0"/>
+              <a:t>Actual </a:t>
+            </a:r>
+            <a:r>
+              <a:rPr lang="en-US" dirty="0"/>
+              <a:t>Result: </a:t>
+            </a:r>
+          </a:p>
+          <a:p>
+            <a:pPr lvl="1"/>
+            <a:r>
+              <a:rPr lang="en-US" dirty="0"/>
+              <a:t>Project will be updated in the database</a:t>
+            </a:r>
+            <a:endParaRPr lang="en-US" dirty="0"/>
+          </a:p>
+          <a:p>
+            <a:pPr lvl="1"/>
+            <a:r>
+              <a:rPr lang="en-US" dirty="0"/>
+              <a:t>Projects panel table will be updated</a:t>
+            </a:r>
+            <a:endParaRPr lang="en-US" dirty="0"/>
+          </a:p>
+          <a:p>
+            <a:pPr lvl="1"/>
+            <a:r>
+              <a:rPr lang="en-US" dirty="0"/>
+              <a:t>Users will be updated in the database</a:t>
+            </a:r>
+            <a:endParaRPr lang="en-US" dirty="0"/>
+          </a:p>
+          <a:p>
+            <a:pPr lvl="1"/>
+            <a:r>
+              <a:rPr lang="en-US" dirty="0"/>
+              <a:t>Users panel table will be updated</a:t>
+            </a:r>
+            <a:endParaRPr lang="en-US" dirty="0"/>
+          </a:p>
+          <a:p>
+            <a:pPr lvl="1"/>
+            <a:r>
+              <a:rPr lang="en-US" dirty="0"/>
+              <a:t>Tester will be notified of success</a:t>
+            </a:r>
+            <a:endParaRPr lang="en-US" dirty="0"/>
+          </a:p>
+          <a:p>
+            <a:r>
+              <a:rPr lang="en-US" dirty="0" smtClean="0"/>
+              <a:t>Status </a:t>
+            </a:r>
+            <a:r>
+              <a:rPr lang="en-US" dirty="0"/>
+              <a:t>(Fail/Pass): </a:t>
+            </a:r>
+            <a:r>
+              <a:rPr lang="en-US" dirty="0" smtClean="0"/>
+              <a:t>PASS</a:t>
+            </a:r>
+            <a:endParaRPr lang="en-US" dirty="0"/>
+          </a:p>
+          <a:p>
+            <a:pPr lvl="1"/>
+            <a:endParaRPr lang="en-US" dirty="0"/>
+          </a:p>
+        </p:txBody>
+      </p:sp>
+    </p:spTree>
+    <p:extLst>
+      <p:ext uri="{BB962C8B-B14F-4D97-AF65-F5344CB8AC3E}">
+        <p14:creationId xmlns:p14="http://schemas.microsoft.com/office/powerpoint/2010/main" val="770846658"/>
+      </p:ext>
+    </p:extLst>
+  </p:cSld>
+  <p:clrMapOvr>
+    <a:masterClrMapping/>
+  </p:clrMapOvr>
+</p:sld>
+</file>
+
+<file path=ppt/slides/slide19.xml><?xml version="1.0" encoding="utf-8"?>
+<p:sld xmlns:a="http://schemas.openxmlformats.org/drawingml/2006/main" xmlns:r="http://schemas.openxmlformats.org/officeDocument/2006/relationships" xmlns:p="http://schemas.openxmlformats.org/presentationml/2006/main">
+  <p:cSld>
+    <p:spTree>
+      <p:nvGrpSpPr>
+        <p:cNvPr id="1" name=""/>
+        <p:cNvGrpSpPr/>
+        <p:nvPr/>
+      </p:nvGrpSpPr>
+      <p:grpSpPr>
+        <a:xfrm>
+          <a:off x="0" y="0"/>
+          <a:ext cx="0" cy="0"/>
+          <a:chOff x="0" y="0"/>
+          <a:chExt cx="0" cy="0"/>
+        </a:xfrm>
+      </p:grpSpPr>
+      <p:sp>
+        <p:nvSpPr>
+          <p:cNvPr id="2" name="Title 1"/>
+          <p:cNvSpPr>
+            <a:spLocks noGrp="1"/>
+          </p:cNvSpPr>
+          <p:nvPr>
+            <p:ph type="title"/>
+          </p:nvPr>
+        </p:nvSpPr>
+        <p:spPr/>
+        <p:txBody>
+          <a:bodyPr/>
+          <a:lstStyle/>
+          <a:p>
+            <a:r>
+              <a:rPr lang="en-US" dirty="0" smtClean="0"/>
               <a:t>Summary</a:t>
             </a:r>
-          </a:p>
-          <a:p>
-            <a:r>
-              <a:rPr lang="en-US" dirty="0" smtClean="0"/>
-              <a:t>contact information</a:t>
-            </a:r>
-          </a:p>
-          <a:p>
-            <a:r>
-              <a:rPr lang="en-US" dirty="0" smtClean="0"/>
-              <a:t>Questions?</a:t>
-            </a:r>
-          </a:p>
-          <a:p>
-            <a:r>
-              <a:rPr lang="en-US" smtClean="0"/>
+            <a:endParaRPr lang="en-US" dirty="0"/>
+          </a:p>
+        </p:txBody>
+      </p:sp>
+      <p:sp>
+        <p:nvSpPr>
+          <p:cNvPr id="3" name="Content Placeholder 2"/>
+          <p:cNvSpPr>
+            <a:spLocks noGrp="1"/>
+          </p:cNvSpPr>
+          <p:nvPr>
+            <p:ph idx="1"/>
+          </p:nvPr>
+        </p:nvSpPr>
+        <p:spPr/>
+        <p:txBody>
+          <a:bodyPr/>
+          <a:lstStyle/>
+          <a:p>
+            <a:pPr lvl="0">
+              <a:spcAft>
+                <a:spcPts val="0"/>
+              </a:spcAft>
+              <a:buClr>
+                <a:srgbClr val="001D4D"/>
+              </a:buClr>
+              <a:buSzPct val="100000"/>
+              <a:buFont typeface="Noto Sans Symbols"/>
+              <a:buChar char="●"/>
+            </a:pPr>
+            <a:r>
+              <a:rPr lang="en-US" dirty="0" smtClean="0"/>
+              <a:t>Steve </a:t>
+            </a:r>
+            <a:r>
+              <a:rPr lang="en-US" dirty="0" err="1" smtClean="0"/>
+              <a:t>Hirabayashi</a:t>
+            </a:r>
+            <a:r>
+              <a:rPr lang="en-US" dirty="0" smtClean="0"/>
+              <a:t> </a:t>
+            </a:r>
+            <a:r>
+              <a:rPr lang="en-US" dirty="0"/>
+              <a:t>- shira002@fiu.edu</a:t>
+            </a:r>
+            <a:endParaRPr lang="en-US" dirty="0" smtClean="0"/>
+          </a:p>
+          <a:p>
+            <a:pPr lvl="0">
+              <a:spcAft>
+                <a:spcPts val="0"/>
+              </a:spcAft>
+              <a:buClr>
+                <a:srgbClr val="001D4D"/>
+              </a:buClr>
+              <a:buSzPct val="100000"/>
+              <a:buFont typeface="Noto Sans Symbols"/>
+              <a:buChar char="●"/>
+            </a:pPr>
+            <a:r>
+              <a:rPr lang="en-US" dirty="0" smtClean="0"/>
+              <a:t>Dale Keith </a:t>
+            </a:r>
+            <a:r>
+              <a:rPr lang="mr-IN" dirty="0" smtClean="0"/>
+              <a:t>–</a:t>
+            </a:r>
+            <a:r>
+              <a:rPr lang="en-US" dirty="0" smtClean="0"/>
+              <a:t> </a:t>
+            </a:r>
+            <a:r>
+              <a:rPr lang="en-US" sz="2400" dirty="0" smtClean="0"/>
+              <a:t>dkeit008@fiu.edu</a:t>
+            </a:r>
+            <a:endParaRPr lang="en-US" sz="2400" dirty="0"/>
+          </a:p>
+          <a:p>
+            <a:pPr lvl="0">
+              <a:spcAft>
+                <a:spcPts val="0"/>
+              </a:spcAft>
+              <a:buClr>
+                <a:srgbClr val="001D4D"/>
+              </a:buClr>
+              <a:buSzPct val="100000"/>
+              <a:buFont typeface="Noto Sans Symbols"/>
+              <a:buChar char="●"/>
+            </a:pPr>
+            <a:r>
+              <a:rPr lang="en-US" dirty="0" smtClean="0"/>
+              <a:t>Adam Levy- </a:t>
+            </a:r>
+            <a:r>
+              <a:rPr lang="en-US" sz="2400" dirty="0" smtClean="0"/>
+              <a:t>alevy030@fiu.edu</a:t>
+            </a:r>
+          </a:p>
+          <a:p>
+            <a:pPr lvl="0">
+              <a:spcAft>
+                <a:spcPts val="0"/>
+              </a:spcAft>
+              <a:buClr>
+                <a:srgbClr val="001D4D"/>
+              </a:buClr>
+              <a:buSzPct val="100000"/>
+              <a:buFont typeface="Noto Sans Symbols"/>
+              <a:buChar char="●"/>
+            </a:pPr>
+            <a:r>
+              <a:rPr lang="en-US" sz="2400" dirty="0"/>
+              <a:t>Andres Moser - </a:t>
+            </a:r>
+            <a:r>
+              <a:rPr lang="en-US" sz="2400" dirty="0" smtClean="0"/>
+              <a:t>amose001@fiu.edu</a:t>
+            </a:r>
+          </a:p>
+          <a:p>
+            <a:pPr lvl="0">
+              <a:spcAft>
+                <a:spcPts val="0"/>
+              </a:spcAft>
+              <a:buClr>
+                <a:srgbClr val="001D4D"/>
+              </a:buClr>
+              <a:buSzPct val="100000"/>
+              <a:buFont typeface="Noto Sans Symbols"/>
+              <a:buChar char="●"/>
+            </a:pPr>
+            <a:r>
+              <a:rPr lang="en-US" sz="2400" dirty="0"/>
+              <a:t>Leon Liang - </a:t>
+            </a:r>
+            <a:r>
+              <a:rPr lang="en-US" sz="2400" dirty="0" smtClean="0"/>
+              <a:t>llian008@fiu.edu</a:t>
+            </a:r>
+            <a:endParaRPr lang="en-US" sz="2400" dirty="0"/>
+          </a:p>
+          <a:p>
+            <a:r>
+              <a:rPr lang="en-US" dirty="0" smtClean="0"/>
+              <a:t>Questions</a:t>
+            </a:r>
+            <a:r>
+              <a:rPr lang="en-US" dirty="0" smtClean="0"/>
+              <a:t>?</a:t>
+            </a:r>
+          </a:p>
+          <a:p>
+            <a:r>
+              <a:rPr lang="en-US" dirty="0" smtClean="0"/>
               <a:t>Thank You!</a:t>
             </a:r>
             <a:endParaRPr lang="en-US" dirty="0"/>
           </a:p>
         </p:txBody>
       </p:sp>
+      <p:pic>
+        <p:nvPicPr>
+          <p:cNvPr id="4" name="Picture 3"/>
+          <p:cNvPicPr>
+            <a:picLocks noChangeAspect="1"/>
+          </p:cNvPicPr>
+          <p:nvPr/>
+        </p:nvPicPr>
+        <p:blipFill>
+          <a:blip r:embed="rId3">
+            <a:extLst>
+              <a:ext uri="{28A0092B-C50C-407E-A947-70E740481C1C}">
+                <a14:useLocalDpi xmlns:a14="http://schemas.microsoft.com/office/drawing/2010/main" val="0"/>
+              </a:ext>
+            </a:extLst>
+          </a:blip>
+          <a:stretch>
+            <a:fillRect/>
+          </a:stretch>
+        </p:blipFill>
+        <p:spPr>
+          <a:xfrm>
+            <a:off x="6882470" y="2036978"/>
+            <a:ext cx="1984284" cy="538430"/>
+          </a:xfrm>
+          <a:prstGeom prst="rect">
+            <a:avLst/>
+          </a:prstGeom>
+        </p:spPr>
+      </p:pic>
+      <p:pic>
+        <p:nvPicPr>
+          <p:cNvPr id="5" name="Picture 4"/>
+          <p:cNvPicPr>
+            <a:picLocks noChangeAspect="1"/>
+          </p:cNvPicPr>
+          <p:nvPr/>
+        </p:nvPicPr>
+        <p:blipFill>
+          <a:blip r:embed="rId4">
+            <a:extLst>
+              <a:ext uri="{28A0092B-C50C-407E-A947-70E740481C1C}">
+                <a14:useLocalDpi xmlns:a14="http://schemas.microsoft.com/office/drawing/2010/main" val="0"/>
+              </a:ext>
+            </a:extLst>
+          </a:blip>
+          <a:stretch>
+            <a:fillRect/>
+          </a:stretch>
+        </p:blipFill>
+        <p:spPr>
+          <a:xfrm>
+            <a:off x="6780180" y="3850252"/>
+            <a:ext cx="1822766" cy="485197"/>
+          </a:xfrm>
+          <a:prstGeom prst="rect">
+            <a:avLst/>
+          </a:prstGeom>
+        </p:spPr>
+      </p:pic>
+      <p:pic>
+        <p:nvPicPr>
+          <p:cNvPr id="6" name="Picture 5"/>
+          <p:cNvPicPr>
+            <a:picLocks noChangeAspect="1"/>
+          </p:cNvPicPr>
+          <p:nvPr/>
+        </p:nvPicPr>
+        <p:blipFill>
+          <a:blip r:embed="rId5">
+            <a:extLst>
+              <a:ext uri="{28A0092B-C50C-407E-A947-70E740481C1C}">
+                <a14:useLocalDpi xmlns:a14="http://schemas.microsoft.com/office/drawing/2010/main" val="0"/>
+              </a:ext>
+            </a:extLst>
+          </a:blip>
+          <a:stretch>
+            <a:fillRect/>
+          </a:stretch>
+        </p:blipFill>
+        <p:spPr>
+          <a:xfrm>
+            <a:off x="7049496" y="4685760"/>
+            <a:ext cx="1490396" cy="911920"/>
+          </a:xfrm>
+          <a:prstGeom prst="rect">
+            <a:avLst/>
+          </a:prstGeom>
+        </p:spPr>
+      </p:pic>
+      <p:pic>
+        <p:nvPicPr>
+          <p:cNvPr id="7" name="Picture 6"/>
+          <p:cNvPicPr>
+            <a:picLocks noChangeAspect="1"/>
+          </p:cNvPicPr>
+          <p:nvPr/>
+        </p:nvPicPr>
+        <p:blipFill>
+          <a:blip r:embed="rId6">
+            <a:extLst>
+              <a:ext uri="{28A0092B-C50C-407E-A947-70E740481C1C}">
+                <a14:useLocalDpi xmlns:a14="http://schemas.microsoft.com/office/drawing/2010/main" val="0"/>
+              </a:ext>
+            </a:extLst>
+          </a:blip>
+          <a:stretch>
+            <a:fillRect/>
+          </a:stretch>
+        </p:blipFill>
+        <p:spPr>
+          <a:xfrm>
+            <a:off x="6746446" y="2939424"/>
+            <a:ext cx="2096496" cy="635712"/>
+          </a:xfrm>
+          <a:prstGeom prst="rect">
+            <a:avLst/>
+          </a:prstGeom>
+        </p:spPr>
+      </p:pic>
+      <p:pic>
+        <p:nvPicPr>
+          <p:cNvPr id="10" name="Picture 9"/>
+          <p:cNvPicPr>
+            <a:picLocks noChangeAspect="1"/>
+          </p:cNvPicPr>
+          <p:nvPr/>
+        </p:nvPicPr>
+        <p:blipFill>
+          <a:blip r:embed="rId7">
+            <a:extLst>
+              <a:ext uri="{28A0092B-C50C-407E-A947-70E740481C1C}">
+                <a14:useLocalDpi xmlns:a14="http://schemas.microsoft.com/office/drawing/2010/main" val="0"/>
+              </a:ext>
+            </a:extLst>
+          </a:blip>
+          <a:stretch>
+            <a:fillRect/>
+          </a:stretch>
+        </p:blipFill>
+        <p:spPr>
+          <a:xfrm>
+            <a:off x="6847329" y="844768"/>
+            <a:ext cx="1976563" cy="620016"/>
+          </a:xfrm>
+          <a:prstGeom prst="rect">
+            <a:avLst/>
+          </a:prstGeom>
+        </p:spPr>
+      </p:pic>
     </p:spTree>
     <p:extLst>
       <p:ext uri="{BB962C8B-B14F-4D97-AF65-F5344CB8AC3E}">
@@ -9816,7 +11407,6 @@
               <a:rPr lang="is-IS" sz="1600" dirty="0" smtClean="0"/>
               <a:t>Improved UI and access to information</a:t>
             </a:r>
-            <a:endParaRPr lang="is-IS" sz="1600" dirty="0" smtClean="0"/>
           </a:p>
           <a:p>
             <a:pPr>
@@ -9869,17 +11459,8 @@
             </a:pPr>
             <a:r>
               <a:rPr lang="en-US" sz="1600" dirty="0" smtClean="0"/>
-              <a:t>Dale: Added </a:t>
-            </a:r>
-            <a:r>
-              <a:rPr lang="en-US" sz="1600" dirty="0" smtClean="0"/>
-              <a:t>support for additional videos and documents on projects, </a:t>
-            </a:r>
-            <a:r>
-              <a:rPr lang="en-US" sz="1600" dirty="0" smtClean="0"/>
-              <a:t>improved UI and added information to project cards</a:t>
-            </a:r>
-            <a:endParaRPr lang="en-US" sz="1600" dirty="0" smtClean="0"/>
+              <a:t>Dale: Added support for additional videos and documents on projects, improved UI and added information to project cards</a:t>
+            </a:r>
           </a:p>
         </p:txBody>
       </p:sp>
@@ -9888,6 +11469,13 @@
   <p:clrMapOvr>
     <a:masterClrMapping/>
   </p:clrMapOvr>
+  <p:timing>
+    <p:tnLst>
+      <p:par>
+        <p:cTn id="1" dur="indefinite" restart="never" nodeType="tmRoot"/>
+      </p:par>
+    </p:tnLst>
+  </p:timing>
 </p:sld>
 </file>
 
@@ -9930,36 +11518,35 @@
           </a:p>
         </p:txBody>
       </p:sp>
-      <p:sp>
-        <p:nvSpPr>
-          <p:cNvPr id="3" name="Content Placeholder 2"/>
-          <p:cNvSpPr>
-            <a:spLocks noGrp="1"/>
-          </p:cNvSpPr>
+      <p:pic>
+        <p:nvPicPr>
+          <p:cNvPr id="4" name="Content Placeholder 3"/>
+          <p:cNvPicPr>
+            <a:picLocks noGrp="1" noChangeAspect="1"/>
+          </p:cNvPicPr>
           <p:nvPr>
             <p:ph idx="1"/>
           </p:nvPr>
-        </p:nvSpPr>
-        <p:spPr/>
-        <p:txBody>
-          <a:bodyPr/>
-          <a:lstStyle/>
-          <a:p>
-            <a:r>
-              <a:rPr lang="en-US" dirty="0"/>
-              <a:t>Gantt </a:t>
-            </a:r>
-            <a:r>
-              <a:rPr lang="en-US" dirty="0" smtClean="0"/>
-              <a:t>Chart showing the schedule </a:t>
-            </a:r>
-            <a:r>
-              <a:rPr lang="en-US" dirty="0"/>
-              <a:t>for entire semester</a:t>
-            </a:r>
-          </a:p>
-        </p:txBody>
-      </p:sp>
+        </p:nvPicPr>
+        <p:blipFill>
+          <a:blip r:embed="rId3">
+            <a:extLst>
+              <a:ext uri="{28A0092B-C50C-407E-A947-70E740481C1C}">
+                <a14:useLocalDpi xmlns:a14="http://schemas.microsoft.com/office/drawing/2010/main" val="0"/>
+              </a:ext>
+            </a:extLst>
+          </a:blip>
+          <a:stretch>
+            <a:fillRect/>
+          </a:stretch>
+        </p:blipFill>
+        <p:spPr>
+          <a:xfrm>
+            <a:off x="1754872" y="1828800"/>
+            <a:ext cx="5632668" cy="4208463"/>
+          </a:xfrm>
+        </p:spPr>
+      </p:pic>
     </p:spTree>
     <p:extLst>
       <p:ext uri="{BB962C8B-B14F-4D97-AF65-F5344CB8AC3E}">
@@ -9970,6 +11557,13 @@
   <p:clrMapOvr>
     <a:masterClrMapping/>
   </p:clrMapOvr>
+  <p:timing>
+    <p:tnLst>
+      <p:par>
+        <p:cTn id="1" dur="indefinite" restart="never" nodeType="tmRoot"/>
+      </p:par>
+    </p:tnLst>
+  </p:timing>
 </p:sld>
 </file>
 
@@ -10007,7 +11601,7 @@
           <a:p>
             <a:r>
               <a:rPr lang="en-US" dirty="0" smtClean="0"/>
-              <a:t>Requirements: User Stories </a:t>
+              <a:t>Key User Stories </a:t>
             </a:r>
             <a:endParaRPr lang="en-US" dirty="0"/>
           </a:p>
@@ -10028,17 +11622,72 @@
           <a:bodyPr/>
           <a:lstStyle/>
           <a:p>
-            <a:r>
-              <a:rPr lang="en-US" dirty="0" smtClean="0"/>
-              <a:t>List the user stories that you worked on them.</a:t>
-            </a:r>
-          </a:p>
-          <a:p>
-            <a:r>
-              <a:rPr lang="en-US" dirty="0" smtClean="0"/>
-              <a:t>Go into the details of the most important/significant one.</a:t>
-            </a:r>
-            <a:endParaRPr lang="en-US" dirty="0"/>
+            <a:pPr marL="457200" indent="-457200">
+              <a:buFont typeface="+mj-lt"/>
+              <a:buAutoNum type="arabicPeriod"/>
+            </a:pPr>
+            <a:r>
+              <a:rPr lang="en-US" dirty="0"/>
+              <a:t>Add an unlimited number of YouTube videos to a project.</a:t>
+            </a:r>
+          </a:p>
+          <a:p>
+            <a:pPr marL="457200" indent="-457200">
+              <a:buFont typeface="+mj-lt"/>
+              <a:buAutoNum type="arabicPeriod"/>
+            </a:pPr>
+            <a:r>
+              <a:rPr lang="en-US" dirty="0" smtClean="0"/>
+              <a:t>Mobile Judge Integration</a:t>
+            </a:r>
+          </a:p>
+          <a:p>
+            <a:pPr marL="457200" indent="-457200">
+              <a:buFont typeface="+mj-lt"/>
+              <a:buAutoNum type="arabicPeriod"/>
+            </a:pPr>
+            <a:r>
+              <a:rPr lang="en-US" dirty="0" smtClean="0"/>
+              <a:t>Create/Delete Semester</a:t>
+            </a:r>
+          </a:p>
+          <a:p>
+            <a:pPr marL="457200" indent="-457200">
+              <a:buFont typeface="+mj-lt"/>
+              <a:buAutoNum type="arabicPeriod"/>
+            </a:pPr>
+            <a:r>
+              <a:rPr lang="en-US" dirty="0" smtClean="0"/>
+              <a:t>Redesign Admin Panel </a:t>
+            </a:r>
+            <a:r>
+              <a:rPr lang="mr-IN" dirty="0" smtClean="0"/>
+              <a:t>–</a:t>
+            </a:r>
+            <a:r>
+              <a:rPr lang="en-US" dirty="0" smtClean="0"/>
+              <a:t> Projects/Users</a:t>
+            </a:r>
+          </a:p>
+          <a:p>
+            <a:pPr marL="457200" indent="-457200">
+              <a:buFont typeface="+mj-lt"/>
+              <a:buAutoNum type="arabicPeriod"/>
+            </a:pPr>
+            <a:r>
+              <a:rPr lang="en-US" dirty="0"/>
+              <a:t>Create Admin Panel Tabs</a:t>
+            </a:r>
+          </a:p>
+          <a:p>
+            <a:pPr marL="457200" indent="-457200">
+              <a:buFont typeface="+mj-lt"/>
+              <a:buAutoNum type="arabicPeriod"/>
+            </a:pPr>
+            <a:r>
+              <a:rPr lang="en-US" dirty="0"/>
+              <a:t>Manage Course information</a:t>
+            </a:r>
           </a:p>
         </p:txBody>
       </p:sp>
@@ -10052,6 +11701,13 @@
   <p:clrMapOvr>
     <a:masterClrMapping/>
   </p:clrMapOvr>
+  <p:timing>
+    <p:tnLst>
+      <p:par>
+        <p:cTn id="1" dur="indefinite" restart="never" nodeType="tmRoot"/>
+      </p:par>
+    </p:tnLst>
+  </p:timing>
 </p:sld>
 </file>
 
@@ -10088,8 +11744,12 @@
           <a:lstStyle/>
           <a:p>
             <a:r>
-              <a:rPr lang="en-US" dirty="0" smtClean="0"/>
-              <a:t>Requirements: Use Cases</a:t>
+              <a:rPr lang="en-US" dirty="0"/>
+              <a:t>Add an unlimited number of YouTube videos to a project</a:t>
+            </a:r>
+            <a:r>
+              <a:rPr lang="en-US" dirty="0" smtClean="0"/>
+              <a:t>.</a:t>
             </a:r>
             <a:endParaRPr lang="en-US" dirty="0"/>
           </a:p>
@@ -10112,33 +11772,89 @@
           <a:p>
             <a:r>
               <a:rPr lang="en-US" dirty="0" smtClean="0"/>
-              <a:t>Show the Use Case Diagram for the whole project.</a:t>
-            </a:r>
-          </a:p>
-          <a:p>
-            <a:r>
-              <a:rPr lang="en-US" dirty="0" smtClean="0"/>
-              <a:t>Highlight your use cases.</a:t>
-            </a:r>
-          </a:p>
-          <a:p>
-            <a:r>
-              <a:rPr lang="en-US" dirty="0" smtClean="0"/>
-              <a:t>Show all the details of the most significant use case.</a:t>
-            </a:r>
+              <a:t>Description</a:t>
+            </a:r>
+          </a:p>
+          <a:p>
+            <a:pPr lvl="1"/>
+            <a:r>
+              <a:rPr lang="en-US" dirty="0" smtClean="0"/>
+              <a:t>As </a:t>
+            </a:r>
+            <a:r>
+              <a:rPr lang="en-US" dirty="0"/>
+              <a:t>a user, I want to be able to add as many YouTube videos to a project as possible, exceeding the three video maximum that currently exists</a:t>
+            </a:r>
+            <a:r>
+              <a:rPr lang="en-US" dirty="0" smtClean="0"/>
+              <a:t>.</a:t>
+            </a:r>
+          </a:p>
+          <a:p>
+            <a:r>
+              <a:rPr lang="en-US" dirty="0" smtClean="0"/>
+              <a:t>Acceptance Criteria</a:t>
+            </a:r>
+          </a:p>
+          <a:p>
+            <a:pPr lvl="1"/>
+            <a:r>
+              <a:rPr lang="en-US" dirty="0"/>
+              <a:t>The videos should be displayed in as a gallery on the page</a:t>
+            </a:r>
+            <a:r>
+              <a:rPr lang="en-US" dirty="0" smtClean="0"/>
+              <a:t>.</a:t>
+            </a:r>
+          </a:p>
+          <a:p>
+            <a:pPr lvl="1"/>
+            <a:r>
+              <a:rPr lang="en-US" dirty="0" smtClean="0"/>
+              <a:t>Fix </a:t>
+            </a:r>
+            <a:r>
+              <a:rPr lang="en-US" dirty="0"/>
+              <a:t>the YouTube playlist field, as it does not currently have any functionality </a:t>
+            </a:r>
+            <a:r>
+              <a:rPr lang="en-US" dirty="0" smtClean="0"/>
+              <a:t>implemented</a:t>
+            </a:r>
+          </a:p>
+          <a:p>
+            <a:pPr lvl="1"/>
+            <a:r>
+              <a:rPr lang="en-US" dirty="0" smtClean="0"/>
+              <a:t>Add </a:t>
+            </a:r>
+            <a:r>
+              <a:rPr lang="en-US" dirty="0"/>
+              <a:t>the number of YouTube videos to the project’s card</a:t>
+            </a:r>
+          </a:p>
+          <a:p>
+            <a:endParaRPr lang="en-US" dirty="0"/>
           </a:p>
         </p:txBody>
       </p:sp>
     </p:spTree>
     <p:extLst>
       <p:ext uri="{BB962C8B-B14F-4D97-AF65-F5344CB8AC3E}">
-        <p14:creationId xmlns:p14="http://schemas.microsoft.com/office/powerpoint/2010/main" val="2354238314"/>
+        <p14:creationId xmlns:p14="http://schemas.microsoft.com/office/powerpoint/2010/main" val="953506346"/>
       </p:ext>
     </p:extLst>
   </p:cSld>
   <p:clrMapOvr>
     <a:masterClrMapping/>
   </p:clrMapOvr>
+  <p:timing>
+    <p:tnLst>
+      <p:par>
+        <p:cTn id="1" dur="indefinite" restart="never" nodeType="tmRoot"/>
+      </p:par>
+    </p:tnLst>
+  </p:timing>
 </p:sld>
 </file>
 
@@ -10169,21 +11885,15 @@
             <p:ph type="title"/>
           </p:nvPr>
         </p:nvSpPr>
-        <p:spPr>
-          <a:xfrm>
-            <a:off x="779463" y="381000"/>
-            <a:ext cx="8059737" cy="1044575"/>
-          </a:xfrm>
-        </p:spPr>
+        <p:spPr/>
         <p:txBody>
           <a:bodyPr/>
           <a:lstStyle/>
           <a:p>
             <a:r>
-              <a:rPr lang="en-US" dirty="0" smtClean="0"/>
-              <a:t>Requirements: Sequence Diagrams</a:t>
-            </a:r>
-            <a:endParaRPr lang="en-US" dirty="0"/>
+              <a:rPr lang="en-US" dirty="0"/>
+              <a:t>Mobile Judge Integration</a:t>
+            </a:r>
           </a:p>
         </p:txBody>
       </p:sp>
@@ -10204,7 +11914,46 @@
           <a:p>
             <a:r>
               <a:rPr lang="en-US" dirty="0" smtClean="0"/>
-              <a:t>Show the sequence diagram of the most significant use case.</a:t>
+              <a:t>Description</a:t>
+            </a:r>
+          </a:p>
+          <a:p>
+            <a:pPr lvl="1"/>
+            <a:r>
+              <a:rPr lang="en-US" dirty="0"/>
+              <a:t>The Mobile Judge application currently uses the API from the old senior project website project. Reconfigure VIP website API so that Mobile Judge can make requests and receive information from the VIP website API</a:t>
+            </a:r>
+            <a:r>
+              <a:rPr lang="en-US" dirty="0" smtClean="0"/>
+              <a:t>.</a:t>
+            </a:r>
+          </a:p>
+          <a:p>
+            <a:r>
+              <a:rPr lang="en-US" dirty="0" smtClean="0"/>
+              <a:t>Acceptance Criteria</a:t>
+            </a:r>
+          </a:p>
+          <a:p>
+            <a:pPr lvl="1"/>
+            <a:r>
+              <a:rPr lang="en-US" dirty="0"/>
+              <a:t>The Mobile Judge application will can make its requests from the VIP Website API</a:t>
+            </a:r>
+            <a:r>
+              <a:rPr lang="en-US" dirty="0" smtClean="0"/>
+              <a:t>.</a:t>
+            </a:r>
+          </a:p>
+          <a:p>
+            <a:pPr lvl="1"/>
+            <a:r>
+              <a:rPr lang="en-US" dirty="0" smtClean="0"/>
+              <a:t>The </a:t>
+            </a:r>
+            <a:r>
+              <a:rPr lang="en-US" dirty="0"/>
+              <a:t>Mobile Judge application will function as it did when making its requests to the SPWS API.</a:t>
             </a:r>
           </a:p>
         </p:txBody>
@@ -10212,13 +11961,20 @@
     </p:spTree>
     <p:extLst>
       <p:ext uri="{BB962C8B-B14F-4D97-AF65-F5344CB8AC3E}">
-        <p14:creationId xmlns:p14="http://schemas.microsoft.com/office/powerpoint/2010/main" val="1062316422"/>
+        <p14:creationId xmlns:p14="http://schemas.microsoft.com/office/powerpoint/2010/main" val="1692440472"/>
       </p:ext>
     </p:extLst>
   </p:cSld>
   <p:clrMapOvr>
     <a:masterClrMapping/>
   </p:clrMapOvr>
+  <p:timing>
+    <p:tnLst>
+      <p:par>
+        <p:cTn id="1" dur="indefinite" restart="never" nodeType="tmRoot"/>
+      </p:par>
+    </p:tnLst>
+  </p:timing>
 </p:sld>
 </file>
 
@@ -10255,10 +12011,9 @@
           <a:lstStyle/>
           <a:p>
             <a:r>
-              <a:rPr lang="en-US" dirty="0" smtClean="0"/>
-              <a:t>System Design: Architecture</a:t>
-            </a:r>
-            <a:endParaRPr lang="en-US" dirty="0"/>
+              <a:rPr lang="en-US" dirty="0"/>
+              <a:t>Create/Delete Semester</a:t>
+            </a:r>
           </a:p>
         </p:txBody>
       </p:sp>
@@ -10278,48 +12033,100 @@
           <a:lstStyle/>
           <a:p>
             <a:r>
+              <a:rPr lang="en-US" dirty="0" smtClean="0"/>
+              <a:t>Description</a:t>
+            </a:r>
+          </a:p>
+          <a:p>
+            <a:pPr lvl="1"/>
+            <a:r>
+              <a:rPr lang="en-US" dirty="0" smtClean="0"/>
+              <a:t>A</a:t>
+            </a:r>
+            <a:r>
               <a:rPr lang="en-US" dirty="0"/>
-              <a:t>System </a:t>
-            </a:r>
-            <a:r>
-              <a:rPr lang="en-US" dirty="0" smtClean="0"/>
-              <a:t>decomposition</a:t>
-            </a:r>
-            <a:endParaRPr lang="en-US" dirty="0"/>
-          </a:p>
-          <a:p>
-            <a:r>
-              <a:rPr lang="en-US" dirty="0" smtClean="0"/>
-              <a:t>Identify </a:t>
+              <a:t>s an Pi/</a:t>
+            </a:r>
+            <a:r>
+              <a:rPr lang="en-US" dirty="0" err="1"/>
+              <a:t>CoPi</a:t>
             </a:r>
             <a:r>
               <a:rPr lang="en-US" dirty="0"/>
-              <a:t>the architecture patterns </a:t>
-            </a:r>
-            <a:r>
-              <a:rPr lang="en-US" dirty="0" smtClean="0"/>
-              <a:t>used</a:t>
-            </a:r>
-          </a:p>
-          <a:p>
-            <a:r>
-              <a:rPr lang="en-US" dirty="0" smtClean="0"/>
-              <a:t>Highlight the parts that you contributed to them</a:t>
-            </a:r>
-            <a:endParaRPr lang="en-US" dirty="0"/>
+              <a:t> I would like to be able to add a new semester with relevant information in the Semester Maintenance Panel.</a:t>
+            </a:r>
+            <a:endParaRPr lang="en-US" dirty="0" smtClean="0"/>
+          </a:p>
+          <a:p>
+            <a:r>
+              <a:rPr lang="en-US" dirty="0" smtClean="0"/>
+              <a:t>Acceptance Criteria</a:t>
+            </a:r>
+          </a:p>
+          <a:p>
+            <a:pPr lvl="1"/>
+            <a:r>
+              <a:rPr lang="en-US" dirty="0"/>
+              <a:t>Ability to choose Start/End Date (</a:t>
+            </a:r>
+            <a:r>
+              <a:rPr lang="en-US" dirty="0" smtClean="0"/>
+              <a:t>MM/DD/YYYY)</a:t>
+            </a:r>
+          </a:p>
+          <a:p>
+            <a:pPr lvl="1"/>
+            <a:r>
+              <a:rPr lang="en-US" dirty="0" smtClean="0"/>
+              <a:t>Admin </a:t>
+            </a:r>
+            <a:r>
+              <a:rPr lang="en-US" dirty="0"/>
+              <a:t>can set name to what they deem appropriate (input is a string</a:t>
+            </a:r>
+            <a:r>
+              <a:rPr lang="en-US" dirty="0" smtClean="0"/>
+              <a:t>)</a:t>
+            </a:r>
+          </a:p>
+          <a:p>
+            <a:pPr lvl="1"/>
+            <a:r>
+              <a:rPr lang="en-US" dirty="0" smtClean="0"/>
+              <a:t>Admin </a:t>
+            </a:r>
+            <a:r>
+              <a:rPr lang="en-US" dirty="0"/>
+              <a:t>can set properties for new Semester(Current, Viewable, Applicable, </a:t>
+            </a:r>
+            <a:r>
+              <a:rPr lang="en-US" dirty="0" err="1"/>
+              <a:t>Proposable</a:t>
+            </a:r>
+            <a:r>
+              <a:rPr lang="en-US" dirty="0"/>
+              <a:t>)</a:t>
+            </a:r>
           </a:p>
         </p:txBody>
       </p:sp>
     </p:spTree>
     <p:extLst>
       <p:ext uri="{BB962C8B-B14F-4D97-AF65-F5344CB8AC3E}">
-        <p14:creationId xmlns:p14="http://schemas.microsoft.com/office/powerpoint/2010/main" val="4211570898"/>
+        <p14:creationId xmlns:p14="http://schemas.microsoft.com/office/powerpoint/2010/main" val="1848063043"/>
       </p:ext>
     </p:extLst>
   </p:cSld>
   <p:clrMapOvr>
     <a:masterClrMapping/>
   </p:clrMapOvr>
+  <p:timing>
+    <p:tnLst>
+      <p:par>
+        <p:cTn id="1" dur="indefinite" restart="never" nodeType="tmRoot"/>
+      </p:par>
+    </p:tnLst>
+  </p:timing>
 </p:sld>
 </file>
 
@@ -10356,8 +12163,12 @@
           <a:lstStyle/>
           <a:p>
             <a:r>
-              <a:rPr lang="en-US" dirty="0" smtClean="0"/>
-              <a:t>System Design: Deployment</a:t>
+              <a:rPr lang="en-US" dirty="0"/>
+              <a:t>Redesign Admin </a:t>
+            </a:r>
+            <a:r>
+              <a:rPr lang="en-US" dirty="0" smtClean="0"/>
+              <a:t>Panel - Projects</a:t>
             </a:r>
             <a:endParaRPr lang="en-US" dirty="0"/>
           </a:p>
@@ -10375,38 +12186,105 @@
         </p:nvSpPr>
         <p:spPr/>
         <p:txBody>
-          <a:bodyPr/>
+          <a:bodyPr>
+            <a:normAutofit fontScale="92500" lnSpcReduction="10000"/>
+          </a:bodyPr>
           <a:lstStyle/>
           <a:p>
             <a:r>
+              <a:rPr lang="en-US" dirty="0" smtClean="0"/>
+              <a:t>Description</a:t>
+            </a:r>
+          </a:p>
+          <a:p>
+            <a:pPr lvl="1"/>
+            <a:r>
+              <a:rPr lang="en-US" dirty="0" smtClean="0"/>
+              <a:t>As </a:t>
+            </a:r>
+            <a:r>
               <a:rPr lang="en-US" dirty="0"/>
-              <a:t>System </a:t>
-            </a:r>
-            <a:r>
-              <a:rPr lang="en-US" dirty="0" smtClean="0"/>
-              <a:t>Deployment Diagram</a:t>
-            </a:r>
-            <a:endParaRPr lang="en-US" dirty="0"/>
-          </a:p>
-          <a:p>
-            <a:r>
-              <a:rPr lang="en-US" dirty="0" smtClean="0"/>
-              <a:t>Highlight the parts that you contributed to them</a:t>
-            </a:r>
-            <a:endParaRPr lang="en-US" dirty="0"/>
+              <a:t>a PI/</a:t>
+            </a:r>
+            <a:r>
+              <a:rPr lang="en-US" dirty="0" err="1"/>
+              <a:t>CoPI</a:t>
+            </a:r>
+            <a:r>
+              <a:rPr lang="en-US" dirty="0"/>
+              <a:t>, I would like to be able to make changes to a project’s properties, so that I can easily modify/update the information of projects.</a:t>
+            </a:r>
+          </a:p>
+          <a:p>
+            <a:r>
+              <a:rPr lang="en-US" dirty="0" smtClean="0"/>
+              <a:t>Acceptance Criteria</a:t>
+            </a:r>
+          </a:p>
+          <a:p>
+            <a:pPr lvl="1"/>
+            <a:r>
+              <a:rPr lang="en-US" dirty="0"/>
+              <a:t>After selecting the option to change the project’s properties and entering the new properties for the project, the project’s updated information will be displayed to the user</a:t>
+            </a:r>
+            <a:r>
+              <a:rPr lang="en-US" dirty="0" smtClean="0"/>
+              <a:t>.</a:t>
+            </a:r>
+          </a:p>
+          <a:p>
+            <a:pPr lvl="1"/>
+            <a:r>
+              <a:rPr lang="en-US" dirty="0" smtClean="0"/>
+              <a:t>Need </a:t>
+            </a:r>
+            <a:r>
+              <a:rPr lang="en-US" dirty="0"/>
+              <a:t>to add ability to change the semester of projects so that PI/</a:t>
+            </a:r>
+            <a:r>
+              <a:rPr lang="en-US" dirty="0" err="1"/>
+              <a:t>CoPI</a:t>
+            </a:r>
+            <a:r>
+              <a:rPr lang="en-US" dirty="0"/>
+              <a:t> can move pending and proposed projects to a better time frame</a:t>
+            </a:r>
+            <a:r>
+              <a:rPr lang="en-US" dirty="0" smtClean="0"/>
+              <a:t>.</a:t>
+            </a:r>
+          </a:p>
+          <a:p>
+            <a:pPr lvl="1"/>
+            <a:r>
+              <a:rPr lang="en-US" dirty="0" smtClean="0"/>
+              <a:t>Merge </a:t>
+            </a:r>
+            <a:r>
+              <a:rPr lang="en-US" dirty="0"/>
+              <a:t>the Admin Panel UI for searching and filtering with the ability to modify the project’s properties.</a:t>
+            </a:r>
           </a:p>
         </p:txBody>
       </p:sp>
     </p:spTree>
     <p:extLst>
       <p:ext uri="{BB962C8B-B14F-4D97-AF65-F5344CB8AC3E}">
-        <p14:creationId xmlns:p14="http://schemas.microsoft.com/office/powerpoint/2010/main" val="2858691249"/>
+        <p14:creationId xmlns:p14="http://schemas.microsoft.com/office/powerpoint/2010/main" val="1405102871"/>
       </p:ext>
     </p:extLst>
   </p:cSld>
   <p:clrMapOvr>
     <a:masterClrMapping/>
   </p:clrMapOvr>
+  <p:timing>
+    <p:tnLst>
+      <p:par>
+        <p:cTn id="1" dur="indefinite" restart="never" nodeType="tmRoot"/>
+      </p:par>
+    </p:tnLst>
+  </p:timing>
 </p:sld>
 </file>
 
@@ -10443,8 +12321,12 @@
           <a:lstStyle/>
           <a:p>
             <a:r>
-              <a:rPr lang="en-US" dirty="0" smtClean="0"/>
-              <a:t>System Design</a:t>
+              <a:rPr lang="en-US" dirty="0"/>
+              <a:t>Redesign Admin </a:t>
+            </a:r>
+            <a:r>
+              <a:rPr lang="en-US" dirty="0" smtClean="0"/>
+              <a:t>Panel - Users</a:t>
             </a:r>
             <a:endParaRPr lang="en-US" dirty="0"/>
           </a:p>
@@ -10462,46 +12344,114 @@
         </p:nvSpPr>
         <p:spPr/>
         <p:txBody>
-          <a:bodyPr/>
+          <a:bodyPr>
+            <a:normAutofit fontScale="92500"/>
+          </a:bodyPr>
           <a:lstStyle/>
           <a:p>
             <a:r>
+              <a:rPr lang="en-US" dirty="0" smtClean="0"/>
+              <a:t>Description</a:t>
+            </a:r>
+          </a:p>
+          <a:p>
+            <a:pPr lvl="1"/>
+            <a:r>
+              <a:rPr lang="en-US" dirty="0" smtClean="0"/>
+              <a:t>A</a:t>
+            </a:r>
+            <a:r>
               <a:rPr lang="en-US" dirty="0"/>
-              <a:t>Persistent data </a:t>
-            </a:r>
-            <a:r>
-              <a:rPr lang="en-US" dirty="0" smtClean="0"/>
-              <a:t>design</a:t>
-            </a:r>
-            <a:endParaRPr lang="en-US" dirty="0"/>
-          </a:p>
-          <a:p>
-            <a:r>
-              <a:rPr lang="en-US" dirty="0" smtClean="0"/>
-              <a:t>Security</a:t>
+              <a:t>s a PI/</a:t>
+            </a:r>
+            <a:r>
+              <a:rPr lang="en-US" dirty="0" err="1"/>
+              <a:t>CoPI</a:t>
             </a:r>
             <a:r>
               <a:rPr lang="en-US" dirty="0"/>
-              <a:t>/</a:t>
-            </a:r>
-            <a:r>
-              <a:rPr lang="en-US" dirty="0" smtClean="0"/>
-              <a:t>Privacy</a:t>
-            </a:r>
-            <a:endParaRPr lang="en-US" dirty="0"/>
+              <a:t>, I would like to be able to make changes to a user’s properties, so that I can easily modify/update the information of users.</a:t>
+            </a:r>
+            <a:endParaRPr lang="en-US" dirty="0" smtClean="0"/>
+          </a:p>
+          <a:p>
+            <a:r>
+              <a:rPr lang="en-US" dirty="0" smtClean="0"/>
+              <a:t>Acceptance Criteria</a:t>
+            </a:r>
+          </a:p>
+          <a:p>
+            <a:pPr lvl="1"/>
+            <a:r>
+              <a:rPr lang="en-US" dirty="0" smtClean="0"/>
+              <a:t>After </a:t>
+            </a:r>
+            <a:r>
+              <a:rPr lang="en-US" dirty="0"/>
+              <a:t>selecting the option to change the user’s  properties and entering the new properties for the project, the  user’s updated information will be displayed to the </a:t>
+            </a:r>
+            <a:r>
+              <a:rPr lang="en-US" dirty="0" smtClean="0"/>
+              <a:t>user.</a:t>
+            </a:r>
+          </a:p>
+          <a:p>
+            <a:pPr lvl="1"/>
+            <a:r>
+              <a:rPr lang="en-US" dirty="0" smtClean="0"/>
+              <a:t>Need </a:t>
+            </a:r>
+            <a:r>
+              <a:rPr lang="en-US" dirty="0"/>
+              <a:t>to add ability to change the semester of user’s so that PI/</a:t>
+            </a:r>
+            <a:r>
+              <a:rPr lang="en-US" dirty="0" err="1"/>
+              <a:t>CoPI</a:t>
+            </a:r>
+            <a:r>
+              <a:rPr lang="en-US" dirty="0"/>
+              <a:t> can move users to future </a:t>
+            </a:r>
+            <a:r>
+              <a:rPr lang="en-US" dirty="0" smtClean="0"/>
+              <a:t>semesters.</a:t>
+            </a:r>
+          </a:p>
+          <a:p>
+            <a:pPr lvl="1"/>
+            <a:r>
+              <a:rPr lang="en-US" dirty="0" smtClean="0"/>
+              <a:t>Merge </a:t>
+            </a:r>
+            <a:r>
+              <a:rPr lang="en-US" dirty="0"/>
+              <a:t>the Admin Panel UI for searching and filtering with the ability to modify the  user’s properties.</a:t>
+            </a:r>
+          </a:p>
+          <a:p>
+            <a:pPr lvl="1"/>
+            <a:endParaRPr lang="en-US" dirty="0" smtClean="0"/>
           </a:p>
         </p:txBody>
       </p:sp>
     </p:spTree>
     <p:extLst>
       <p:ext uri="{BB962C8B-B14F-4D97-AF65-F5344CB8AC3E}">
-        <p14:creationId xmlns:p14="http://schemas.microsoft.com/office/powerpoint/2010/main" val="2596639212"/>
+        <p14:creationId xmlns:p14="http://schemas.microsoft.com/office/powerpoint/2010/main" val="1932886214"/>
       </p:ext>
     </p:extLst>
   </p:cSld>
   <p:clrMapOvr>
     <a:masterClrMapping/>
   </p:clrMapOvr>
+  <p:timing>
+    <p:tnLst>
+      <p:par>
+        <p:cTn id="1" dur="indefinite" restart="never" nodeType="tmRoot"/>
+      </p:par>
+    </p:tnLst>
+  </p:timing>
 </p:sld>
 </file>
 

</xml_diff>